<commit_message>
some more changes for the book version
</commit_message>
<xml_diff>
--- a/Figs/figures.pptx
+++ b/Figs/figures.pptx
@@ -11,6 +11,8 @@
     <p:sldId id="271" r:id="rId5"/>
     <p:sldId id="272" r:id="rId6"/>
     <p:sldId id="273" r:id="rId7"/>
+    <p:sldId id="274" r:id="rId8"/>
+    <p:sldId id="275" r:id="rId9"/>
   </p:sldIdLst>
   <p:sldSz cx="9144000" cy="6858000" type="screen4x3"/>
   <p:notesSz cx="6858000" cy="9144000"/>
@@ -310,7 +312,7 @@
             <a:fld id="{1D8BD707-D9CF-40AE-B4C6-C98DA3205C09}" type="datetimeFigureOut">
               <a:rPr lang="en-US" smtClean="0"/>
               <a:pPr/>
-              <a:t>5/25/16</a:t>
+              <a:t>9/10/17</a:t>
             </a:fld>
             <a:endParaRPr lang="en-US"/>
           </a:p>
@@ -477,7 +479,7 @@
             <a:fld id="{1D8BD707-D9CF-40AE-B4C6-C98DA3205C09}" type="datetimeFigureOut">
               <a:rPr lang="en-US" smtClean="0"/>
               <a:pPr/>
-              <a:t>5/25/16</a:t>
+              <a:t>9/10/17</a:t>
             </a:fld>
             <a:endParaRPr lang="en-US"/>
           </a:p>
@@ -654,7 +656,7 @@
             <a:fld id="{1D8BD707-D9CF-40AE-B4C6-C98DA3205C09}" type="datetimeFigureOut">
               <a:rPr lang="en-US" smtClean="0"/>
               <a:pPr/>
-              <a:t>5/25/16</a:t>
+              <a:t>9/10/17</a:t>
             </a:fld>
             <a:endParaRPr lang="en-US"/>
           </a:p>
@@ -821,7 +823,7 @@
             <a:fld id="{1D8BD707-D9CF-40AE-B4C6-C98DA3205C09}" type="datetimeFigureOut">
               <a:rPr lang="en-US" smtClean="0"/>
               <a:pPr/>
-              <a:t>5/25/16</a:t>
+              <a:t>9/10/17</a:t>
             </a:fld>
             <a:endParaRPr lang="en-US"/>
           </a:p>
@@ -1064,7 +1066,7 @@
             <a:fld id="{1D8BD707-D9CF-40AE-B4C6-C98DA3205C09}" type="datetimeFigureOut">
               <a:rPr lang="en-US" smtClean="0"/>
               <a:pPr/>
-              <a:t>5/25/16</a:t>
+              <a:t>9/10/17</a:t>
             </a:fld>
             <a:endParaRPr lang="en-US"/>
           </a:p>
@@ -1349,7 +1351,7 @@
             <a:fld id="{1D8BD707-D9CF-40AE-B4C6-C98DA3205C09}" type="datetimeFigureOut">
               <a:rPr lang="en-US" smtClean="0"/>
               <a:pPr/>
-              <a:t>5/25/16</a:t>
+              <a:t>9/10/17</a:t>
             </a:fld>
             <a:endParaRPr lang="en-US"/>
           </a:p>
@@ -1768,7 +1770,7 @@
             <a:fld id="{1D8BD707-D9CF-40AE-B4C6-C98DA3205C09}" type="datetimeFigureOut">
               <a:rPr lang="en-US" smtClean="0"/>
               <a:pPr/>
-              <a:t>5/25/16</a:t>
+              <a:t>9/10/17</a:t>
             </a:fld>
             <a:endParaRPr lang="en-US"/>
           </a:p>
@@ -1883,7 +1885,7 @@
             <a:fld id="{1D8BD707-D9CF-40AE-B4C6-C98DA3205C09}" type="datetimeFigureOut">
               <a:rPr lang="en-US" smtClean="0"/>
               <a:pPr/>
-              <a:t>5/25/16</a:t>
+              <a:t>9/10/17</a:t>
             </a:fld>
             <a:endParaRPr lang="en-US"/>
           </a:p>
@@ -1975,7 +1977,7 @@
             <a:fld id="{1D8BD707-D9CF-40AE-B4C6-C98DA3205C09}" type="datetimeFigureOut">
               <a:rPr lang="en-US" smtClean="0"/>
               <a:pPr/>
-              <a:t>5/25/16</a:t>
+              <a:t>9/10/17</a:t>
             </a:fld>
             <a:endParaRPr lang="en-US"/>
           </a:p>
@@ -2249,7 +2251,7 @@
             <a:fld id="{1D8BD707-D9CF-40AE-B4C6-C98DA3205C09}" type="datetimeFigureOut">
               <a:rPr lang="en-US" smtClean="0"/>
               <a:pPr/>
-              <a:t>5/25/16</a:t>
+              <a:t>9/10/17</a:t>
             </a:fld>
             <a:endParaRPr lang="en-US"/>
           </a:p>
@@ -2499,7 +2501,7 @@
             <a:fld id="{1D8BD707-D9CF-40AE-B4C6-C98DA3205C09}" type="datetimeFigureOut">
               <a:rPr lang="en-US" smtClean="0"/>
               <a:pPr/>
-              <a:t>5/25/16</a:t>
+              <a:t>9/10/17</a:t>
             </a:fld>
             <a:endParaRPr lang="en-US"/>
           </a:p>
@@ -2709,7 +2711,7 @@
             <a:fld id="{1D8BD707-D9CF-40AE-B4C6-C98DA3205C09}" type="datetimeFigureOut">
               <a:rPr lang="en-US" smtClean="0"/>
               <a:pPr/>
-              <a:t>5/25/16</a:t>
+              <a:t>9/10/17</a:t>
             </a:fld>
             <a:endParaRPr lang="en-US"/>
           </a:p>
@@ -19551,6 +19553,1333 @@
 </p:sld>
 </file>
 
+<file path=ppt/slides/slide7.xml><?xml version="1.0" encoding="utf-8"?>
+<p:sld xmlns:a="http://schemas.openxmlformats.org/drawingml/2006/main" xmlns:r="http://schemas.openxmlformats.org/officeDocument/2006/relationships" xmlns:p="http://schemas.openxmlformats.org/presentationml/2006/main">
+  <p:cSld>
+    <p:spTree>
+      <p:nvGrpSpPr>
+        <p:cNvPr id="1" name=""/>
+        <p:cNvGrpSpPr/>
+        <p:nvPr/>
+      </p:nvGrpSpPr>
+      <p:grpSpPr>
+        <a:xfrm>
+          <a:off x="0" y="0"/>
+          <a:ext cx="0" cy="0"/>
+          <a:chOff x="0" y="0"/>
+          <a:chExt cx="0" cy="0"/>
+        </a:xfrm>
+      </p:grpSpPr>
+      <p:grpSp>
+        <p:nvGrpSpPr>
+          <p:cNvPr id="63" name="Group 62"/>
+          <p:cNvGrpSpPr/>
+          <p:nvPr/>
+        </p:nvGrpSpPr>
+        <p:grpSpPr>
+          <a:xfrm>
+            <a:off x="2057400" y="3048000"/>
+            <a:ext cx="3254753" cy="1905000"/>
+            <a:chOff x="2057400" y="3048000"/>
+            <a:chExt cx="3254753" cy="1905000"/>
+          </a:xfrm>
+        </p:grpSpPr>
+        <p:sp>
+          <p:nvSpPr>
+            <p:cNvPr id="2" name="TextBox 1"/>
+            <p:cNvSpPr txBox="1"/>
+            <p:nvPr/>
+          </p:nvSpPr>
+          <p:spPr>
+            <a:xfrm>
+              <a:off x="2367725" y="3048000"/>
+              <a:ext cx="1219200" cy="430887"/>
+            </a:xfrm>
+            <a:prstGeom prst="rect">
+              <a:avLst/>
+            </a:prstGeom>
+            <a:solidFill>
+              <a:schemeClr val="accent5">
+                <a:lumMod val="60000"/>
+                <a:lumOff val="40000"/>
+              </a:schemeClr>
+            </a:solidFill>
+            <a:ln>
+              <a:solidFill>
+                <a:schemeClr val="tx1"/>
+              </a:solidFill>
+            </a:ln>
+          </p:spPr>
+          <p:txBody>
+            <a:bodyPr wrap="square" rtlCol="0">
+              <a:spAutoFit/>
+            </a:bodyPr>
+            <a:lstStyle/>
+            <a:p>
+              <a:pPr algn="ctr"/>
+              <a:r>
+                <a:rPr lang="en-US" sz="1100" dirty="0" smtClean="0">
+                  <a:latin typeface="Helvetica" charset="0"/>
+                  <a:ea typeface="Helvetica" charset="0"/>
+                  <a:cs typeface="Helvetica" charset="0"/>
+                </a:rPr>
+                <a:t>Search for Good Representations</a:t>
+              </a:r>
+              <a:endParaRPr lang="en-US" sz="1100" dirty="0">
+                <a:latin typeface="Helvetica" charset="0"/>
+                <a:ea typeface="Helvetica" charset="0"/>
+                <a:cs typeface="Helvetica" charset="0"/>
+              </a:endParaRPr>
+            </a:p>
+          </p:txBody>
+        </p:sp>
+        <p:sp>
+          <p:nvSpPr>
+            <p:cNvPr id="3" name="TextBox 2"/>
+            <p:cNvSpPr txBox="1"/>
+            <p:nvPr/>
+          </p:nvSpPr>
+          <p:spPr>
+            <a:xfrm>
+              <a:off x="2362200" y="3962400"/>
+              <a:ext cx="1219200" cy="430887"/>
+            </a:xfrm>
+            <a:prstGeom prst="rect">
+              <a:avLst/>
+            </a:prstGeom>
+            <a:solidFill>
+              <a:schemeClr val="accent3"/>
+            </a:solidFill>
+            <a:ln>
+              <a:solidFill>
+                <a:schemeClr val="tx1"/>
+              </a:solidFill>
+            </a:ln>
+          </p:spPr>
+          <p:txBody>
+            <a:bodyPr wrap="square" rtlCol="0">
+              <a:spAutoFit/>
+            </a:bodyPr>
+            <a:lstStyle/>
+            <a:p>
+              <a:pPr algn="ctr"/>
+              <a:r>
+                <a:rPr lang="en-US" sz="1100" dirty="0" smtClean="0">
+                  <a:latin typeface="Helvetica" charset="0"/>
+                  <a:ea typeface="Helvetica" charset="0"/>
+                  <a:cs typeface="Helvetica" charset="0"/>
+                </a:rPr>
+                <a:t>Instantiate</a:t>
+              </a:r>
+            </a:p>
+            <a:p>
+              <a:pPr algn="ctr"/>
+              <a:r>
+                <a:rPr lang="en-US" sz="1100" dirty="0" smtClean="0">
+                  <a:latin typeface="Helvetica" charset="0"/>
+                  <a:ea typeface="Helvetica" charset="0"/>
+                  <a:cs typeface="Helvetica" charset="0"/>
+                </a:rPr>
+                <a:t>Representations</a:t>
+              </a:r>
+              <a:endParaRPr lang="en-US" sz="1100" dirty="0">
+                <a:latin typeface="Helvetica" charset="0"/>
+                <a:ea typeface="Helvetica" charset="0"/>
+                <a:cs typeface="Helvetica" charset="0"/>
+              </a:endParaRPr>
+            </a:p>
+          </p:txBody>
+        </p:sp>
+        <p:cxnSp>
+          <p:nvCxnSpPr>
+            <p:cNvPr id="5" name="Elbow Connector 4"/>
+            <p:cNvCxnSpPr>
+              <a:stCxn id="2" idx="1"/>
+              <a:endCxn id="3" idx="1"/>
+            </p:cNvCxnSpPr>
+            <p:nvPr/>
+          </p:nvCxnSpPr>
+          <p:spPr>
+            <a:xfrm rot="10800000" flipV="1">
+              <a:off x="2362201" y="3263444"/>
+              <a:ext cx="5525" cy="914400"/>
+            </a:xfrm>
+            <a:prstGeom prst="bentConnector3">
+              <a:avLst>
+                <a:gd name="adj1" fmla="val 4832887"/>
+              </a:avLst>
+            </a:prstGeom>
+            <a:ln w="19050">
+              <a:solidFill>
+                <a:schemeClr val="tx1"/>
+              </a:solidFill>
+              <a:tailEnd type="stealth"/>
+            </a:ln>
+          </p:spPr>
+          <p:style>
+            <a:lnRef idx="1">
+              <a:schemeClr val="accent1"/>
+            </a:lnRef>
+            <a:fillRef idx="0">
+              <a:schemeClr val="accent1"/>
+            </a:fillRef>
+            <a:effectRef idx="0">
+              <a:schemeClr val="accent1"/>
+            </a:effectRef>
+            <a:fontRef idx="minor">
+              <a:schemeClr val="tx1"/>
+            </a:fontRef>
+          </p:style>
+        </p:cxnSp>
+        <p:sp>
+          <p:nvSpPr>
+            <p:cNvPr id="15" name="TextBox 14"/>
+            <p:cNvSpPr txBox="1"/>
+            <p:nvPr/>
+          </p:nvSpPr>
+          <p:spPr>
+            <a:xfrm>
+              <a:off x="2057400" y="3589838"/>
+              <a:ext cx="1212191" cy="261610"/>
+            </a:xfrm>
+            <a:prstGeom prst="rect">
+              <a:avLst/>
+            </a:prstGeom>
+            <a:noFill/>
+          </p:spPr>
+          <p:txBody>
+            <a:bodyPr wrap="none" rtlCol="0">
+              <a:spAutoFit/>
+            </a:bodyPr>
+            <a:lstStyle/>
+            <a:p>
+              <a:r>
+                <a:rPr lang="en-US" sz="1100" dirty="0" smtClean="0">
+                  <a:latin typeface="Helvetica" charset="0"/>
+                  <a:ea typeface="Helvetica" charset="0"/>
+                  <a:cs typeface="Helvetica" charset="0"/>
+                </a:rPr>
+                <a:t>Representations</a:t>
+              </a:r>
+              <a:endParaRPr lang="en-US" sz="1100" dirty="0">
+                <a:latin typeface="Helvetica" charset="0"/>
+                <a:ea typeface="Helvetica" charset="0"/>
+                <a:cs typeface="Helvetica" charset="0"/>
+              </a:endParaRPr>
+            </a:p>
+          </p:txBody>
+        </p:sp>
+        <p:sp>
+          <p:nvSpPr>
+            <p:cNvPr id="21" name="TextBox 20"/>
+            <p:cNvSpPr txBox="1"/>
+            <p:nvPr/>
+          </p:nvSpPr>
+          <p:spPr>
+            <a:xfrm>
+              <a:off x="3222371" y="3589838"/>
+              <a:ext cx="704039" cy="261610"/>
+            </a:xfrm>
+            <a:prstGeom prst="rect">
+              <a:avLst/>
+            </a:prstGeom>
+            <a:noFill/>
+          </p:spPr>
+          <p:txBody>
+            <a:bodyPr wrap="none" rtlCol="0">
+              <a:spAutoFit/>
+            </a:bodyPr>
+            <a:lstStyle/>
+            <a:p>
+              <a:r>
+                <a:rPr lang="en-US" sz="1100" dirty="0" smtClean="0">
+                  <a:solidFill>
+                    <a:srgbClr val="FF0000"/>
+                  </a:solidFill>
+                  <a:latin typeface="Helvetica" charset="0"/>
+                  <a:ea typeface="Helvetica" charset="0"/>
+                  <a:cs typeface="Helvetica" charset="0"/>
+                </a:rPr>
+                <a:t>Residue</a:t>
+              </a:r>
+              <a:endParaRPr lang="en-US" sz="1100" dirty="0">
+                <a:solidFill>
+                  <a:srgbClr val="FF0000"/>
+                </a:solidFill>
+                <a:latin typeface="Helvetica" charset="0"/>
+                <a:ea typeface="Helvetica" charset="0"/>
+                <a:cs typeface="Helvetica" charset="0"/>
+              </a:endParaRPr>
+            </a:p>
+          </p:txBody>
+        </p:sp>
+        <p:cxnSp>
+          <p:nvCxnSpPr>
+            <p:cNvPr id="28" name="Elbow Connector 27"/>
+            <p:cNvCxnSpPr/>
+            <p:nvPr/>
+          </p:nvCxnSpPr>
+          <p:spPr>
+            <a:xfrm flipH="1">
+              <a:off x="3575875" y="3394800"/>
+              <a:ext cx="5525" cy="648000"/>
+            </a:xfrm>
+            <a:prstGeom prst="bentConnector3">
+              <a:avLst>
+                <a:gd name="adj1" fmla="val -5090081"/>
+              </a:avLst>
+            </a:prstGeom>
+            <a:ln w="19050">
+              <a:solidFill>
+                <a:srgbClr val="FF0000"/>
+              </a:solidFill>
+              <a:headEnd type="stealth"/>
+              <a:tailEnd type="none"/>
+            </a:ln>
+          </p:spPr>
+          <p:style>
+            <a:lnRef idx="1">
+              <a:schemeClr val="accent1"/>
+            </a:lnRef>
+            <a:fillRef idx="0">
+              <a:schemeClr val="accent1"/>
+            </a:fillRef>
+            <a:effectRef idx="0">
+              <a:schemeClr val="accent1"/>
+            </a:effectRef>
+            <a:fontRef idx="minor">
+              <a:schemeClr val="tx1"/>
+            </a:fontRef>
+          </p:style>
+        </p:cxnSp>
+        <p:cxnSp>
+          <p:nvCxnSpPr>
+            <p:cNvPr id="47" name="Elbow Connector 46"/>
+            <p:cNvCxnSpPr/>
+            <p:nvPr/>
+          </p:nvCxnSpPr>
+          <p:spPr>
+            <a:xfrm flipH="1">
+              <a:off x="3581400" y="3104506"/>
+              <a:ext cx="5525" cy="180000"/>
+            </a:xfrm>
+            <a:prstGeom prst="bentConnector3">
+              <a:avLst>
+                <a:gd name="adj1" fmla="val -5090081"/>
+              </a:avLst>
+            </a:prstGeom>
+            <a:ln w="19050">
+              <a:solidFill>
+                <a:schemeClr val="accent5">
+                  <a:lumMod val="60000"/>
+                  <a:lumOff val="40000"/>
+                </a:schemeClr>
+              </a:solidFill>
+              <a:headEnd type="stealth"/>
+              <a:tailEnd type="none"/>
+            </a:ln>
+          </p:spPr>
+          <p:style>
+            <a:lnRef idx="1">
+              <a:schemeClr val="accent1"/>
+            </a:lnRef>
+            <a:fillRef idx="0">
+              <a:schemeClr val="accent1"/>
+            </a:fillRef>
+            <a:effectRef idx="0">
+              <a:schemeClr val="accent1"/>
+            </a:effectRef>
+            <a:fontRef idx="minor">
+              <a:schemeClr val="tx1"/>
+            </a:fontRef>
+          </p:style>
+        </p:cxnSp>
+        <p:cxnSp>
+          <p:nvCxnSpPr>
+            <p:cNvPr id="48" name="Elbow Connector 47"/>
+            <p:cNvCxnSpPr/>
+            <p:nvPr/>
+          </p:nvCxnSpPr>
+          <p:spPr>
+            <a:xfrm flipH="1">
+              <a:off x="3581400" y="4153094"/>
+              <a:ext cx="5525" cy="180000"/>
+            </a:xfrm>
+            <a:prstGeom prst="bentConnector3">
+              <a:avLst>
+                <a:gd name="adj1" fmla="val -5090081"/>
+              </a:avLst>
+            </a:prstGeom>
+            <a:ln w="19050">
+              <a:solidFill>
+                <a:schemeClr val="accent3"/>
+              </a:solidFill>
+              <a:headEnd type="stealth"/>
+              <a:tailEnd type="none"/>
+            </a:ln>
+          </p:spPr>
+          <p:style>
+            <a:lnRef idx="1">
+              <a:schemeClr val="accent1"/>
+            </a:lnRef>
+            <a:fillRef idx="0">
+              <a:schemeClr val="accent1"/>
+            </a:fillRef>
+            <a:effectRef idx="0">
+              <a:schemeClr val="accent1"/>
+            </a:effectRef>
+            <a:fontRef idx="minor">
+              <a:schemeClr val="tx1"/>
+            </a:fontRef>
+          </p:style>
+        </p:cxnSp>
+        <p:sp>
+          <p:nvSpPr>
+            <p:cNvPr id="49" name="TextBox 48"/>
+            <p:cNvSpPr txBox="1"/>
+            <p:nvPr/>
+          </p:nvSpPr>
+          <p:spPr>
+            <a:xfrm>
+              <a:off x="3926409" y="3063701"/>
+              <a:ext cx="1234633" cy="261610"/>
+            </a:xfrm>
+            <a:prstGeom prst="rect">
+              <a:avLst/>
+            </a:prstGeom>
+            <a:noFill/>
+          </p:spPr>
+          <p:txBody>
+            <a:bodyPr wrap="none" rtlCol="0">
+              <a:spAutoFit/>
+            </a:bodyPr>
+            <a:lstStyle/>
+            <a:p>
+              <a:r>
+                <a:rPr lang="en-US" sz="1100" dirty="0" smtClean="0">
+                  <a:latin typeface="Helvetica" charset="0"/>
+                  <a:ea typeface="Helvetica" charset="0"/>
+                  <a:cs typeface="Helvetica" charset="0"/>
+                </a:rPr>
+                <a:t>Generation Loop</a:t>
+              </a:r>
+              <a:endParaRPr lang="en-US" sz="1100" dirty="0">
+                <a:latin typeface="Helvetica" charset="0"/>
+                <a:ea typeface="Helvetica" charset="0"/>
+                <a:cs typeface="Helvetica" charset="0"/>
+              </a:endParaRPr>
+            </a:p>
+          </p:txBody>
+        </p:sp>
+        <p:sp>
+          <p:nvSpPr>
+            <p:cNvPr id="50" name="TextBox 49"/>
+            <p:cNvSpPr txBox="1"/>
+            <p:nvPr/>
+          </p:nvSpPr>
+          <p:spPr>
+            <a:xfrm>
+              <a:off x="3942868" y="3531513"/>
+              <a:ext cx="1252266" cy="430887"/>
+            </a:xfrm>
+            <a:prstGeom prst="rect">
+              <a:avLst/>
+            </a:prstGeom>
+            <a:noFill/>
+          </p:spPr>
+          <p:txBody>
+            <a:bodyPr wrap="none" rtlCol="0">
+              <a:spAutoFit/>
+            </a:bodyPr>
+            <a:lstStyle/>
+            <a:p>
+              <a:pPr algn="ctr"/>
+              <a:r>
+                <a:rPr lang="en-US" sz="1100" dirty="0" smtClean="0">
+                  <a:latin typeface="Helvetica" charset="0"/>
+                  <a:ea typeface="Helvetica" charset="0"/>
+                  <a:cs typeface="Helvetica" charset="0"/>
+                </a:rPr>
+                <a:t>Representational</a:t>
+              </a:r>
+            </a:p>
+            <a:p>
+              <a:pPr algn="ctr"/>
+              <a:r>
+                <a:rPr lang="en-US" sz="1100" dirty="0" smtClean="0">
+                  <a:latin typeface="Helvetica" charset="0"/>
+                  <a:ea typeface="Helvetica" charset="0"/>
+                  <a:cs typeface="Helvetica" charset="0"/>
+                </a:rPr>
+                <a:t>Shift Loop</a:t>
+              </a:r>
+              <a:endParaRPr lang="en-US" sz="1100" dirty="0">
+                <a:latin typeface="Helvetica" charset="0"/>
+                <a:ea typeface="Helvetica" charset="0"/>
+                <a:cs typeface="Helvetica" charset="0"/>
+              </a:endParaRPr>
+            </a:p>
+          </p:txBody>
+        </p:sp>
+        <p:sp>
+          <p:nvSpPr>
+            <p:cNvPr id="51" name="TextBox 50"/>
+            <p:cNvSpPr txBox="1"/>
+            <p:nvPr/>
+          </p:nvSpPr>
+          <p:spPr>
+            <a:xfrm>
+              <a:off x="3825849" y="4096122"/>
+              <a:ext cx="1486304" cy="261610"/>
+            </a:xfrm>
+            <a:prstGeom prst="rect">
+              <a:avLst/>
+            </a:prstGeom>
+            <a:noFill/>
+          </p:spPr>
+          <p:txBody>
+            <a:bodyPr wrap="none" rtlCol="0">
+              <a:spAutoFit/>
+            </a:bodyPr>
+            <a:lstStyle/>
+            <a:p>
+              <a:pPr algn="ctr"/>
+              <a:r>
+                <a:rPr lang="en-US" sz="1100" smtClean="0">
+                  <a:latin typeface="Helvetica" charset="0"/>
+                  <a:ea typeface="Helvetica" charset="0"/>
+                  <a:cs typeface="Helvetica" charset="0"/>
+                </a:rPr>
+                <a:t>Data Coverage Loop</a:t>
+              </a:r>
+              <a:endParaRPr lang="en-US" sz="1100" dirty="0">
+                <a:latin typeface="Helvetica" charset="0"/>
+                <a:ea typeface="Helvetica" charset="0"/>
+                <a:cs typeface="Helvetica" charset="0"/>
+              </a:endParaRPr>
+            </a:p>
+          </p:txBody>
+        </p:sp>
+        <p:cxnSp>
+          <p:nvCxnSpPr>
+            <p:cNvPr id="56" name="Straight Arrow Connector 55"/>
+            <p:cNvCxnSpPr/>
+            <p:nvPr/>
+          </p:nvCxnSpPr>
+          <p:spPr>
+            <a:xfrm>
+              <a:off x="2895600" y="4393287"/>
+              <a:ext cx="0" cy="331113"/>
+            </a:xfrm>
+            <a:prstGeom prst="straightConnector1">
+              <a:avLst/>
+            </a:prstGeom>
+            <a:ln w="19050">
+              <a:solidFill>
+                <a:schemeClr val="tx1"/>
+              </a:solidFill>
+              <a:tailEnd type="stealth"/>
+            </a:ln>
+          </p:spPr>
+          <p:style>
+            <a:lnRef idx="1">
+              <a:schemeClr val="accent1"/>
+            </a:lnRef>
+            <a:fillRef idx="0">
+              <a:schemeClr val="accent1"/>
+            </a:fillRef>
+            <a:effectRef idx="0">
+              <a:schemeClr val="accent1"/>
+            </a:effectRef>
+            <a:fontRef idx="minor">
+              <a:schemeClr val="tx1"/>
+            </a:fontRef>
+          </p:style>
+        </p:cxnSp>
+        <p:cxnSp>
+          <p:nvCxnSpPr>
+            <p:cNvPr id="57" name="Straight Arrow Connector 56"/>
+            <p:cNvCxnSpPr/>
+            <p:nvPr/>
+          </p:nvCxnSpPr>
+          <p:spPr>
+            <a:xfrm flipV="1">
+              <a:off x="3053868" y="4393288"/>
+              <a:ext cx="1" cy="331112"/>
+            </a:xfrm>
+            <a:prstGeom prst="straightConnector1">
+              <a:avLst/>
+            </a:prstGeom>
+            <a:ln w="19050">
+              <a:solidFill>
+                <a:schemeClr val="tx1"/>
+              </a:solidFill>
+              <a:tailEnd type="stealth"/>
+            </a:ln>
+          </p:spPr>
+          <p:style>
+            <a:lnRef idx="1">
+              <a:schemeClr val="accent1"/>
+            </a:lnRef>
+            <a:fillRef idx="0">
+              <a:schemeClr val="accent1"/>
+            </a:fillRef>
+            <a:effectRef idx="0">
+              <a:schemeClr val="accent1"/>
+            </a:effectRef>
+            <a:fontRef idx="minor">
+              <a:schemeClr val="tx1"/>
+            </a:fontRef>
+          </p:style>
+        </p:cxnSp>
+        <p:sp>
+          <p:nvSpPr>
+            <p:cNvPr id="60" name="Oval 59"/>
+            <p:cNvSpPr/>
+            <p:nvPr/>
+          </p:nvSpPr>
+          <p:spPr>
+            <a:xfrm>
+              <a:off x="2519679" y="4640237"/>
+              <a:ext cx="904242" cy="312763"/>
+            </a:xfrm>
+            <a:prstGeom prst="ellipse">
+              <a:avLst/>
+            </a:prstGeom>
+            <a:noFill/>
+            <a:ln w="12700">
+              <a:solidFill>
+                <a:schemeClr val="tx1"/>
+              </a:solidFill>
+            </a:ln>
+          </p:spPr>
+          <p:style>
+            <a:lnRef idx="2">
+              <a:schemeClr val="accent1">
+                <a:shade val="50000"/>
+              </a:schemeClr>
+            </a:lnRef>
+            <a:fillRef idx="1">
+              <a:schemeClr val="accent1"/>
+            </a:fillRef>
+            <a:effectRef idx="0">
+              <a:schemeClr val="accent1"/>
+            </a:effectRef>
+            <a:fontRef idx="minor">
+              <a:schemeClr val="lt1"/>
+            </a:fontRef>
+          </p:style>
+          <p:txBody>
+            <a:bodyPr lIns="0" tIns="0" rIns="0" bIns="0" rtlCol="0" anchor="ctr" anchorCtr="0">
+              <a:noAutofit/>
+            </a:bodyPr>
+            <a:lstStyle/>
+            <a:p>
+              <a:pPr algn="ctr"/>
+              <a:r>
+                <a:rPr lang="en-US" sz="1100" dirty="0" smtClean="0">
+                  <a:solidFill>
+                    <a:schemeClr val="tx1"/>
+                  </a:solidFill>
+                  <a:latin typeface="Helvetica" charset="0"/>
+                  <a:ea typeface="Helvetica" charset="0"/>
+                  <a:cs typeface="Helvetica" charset="0"/>
+                </a:rPr>
+                <a:t>task</a:t>
+              </a:r>
+              <a:endParaRPr lang="en-US" sz="1100" dirty="0">
+                <a:solidFill>
+                  <a:schemeClr val="tx1"/>
+                </a:solidFill>
+                <a:latin typeface="Helvetica" charset="0"/>
+                <a:ea typeface="Helvetica" charset="0"/>
+                <a:cs typeface="Helvetica" charset="0"/>
+              </a:endParaRPr>
+            </a:p>
+          </p:txBody>
+        </p:sp>
+      </p:grpSp>
+    </p:spTree>
+    <p:extLst>
+      <p:ext uri="{BB962C8B-B14F-4D97-AF65-F5344CB8AC3E}">
+        <p14:creationId xmlns:p14="http://schemas.microsoft.com/office/powerpoint/2010/main" val="212468843"/>
+      </p:ext>
+    </p:extLst>
+  </p:cSld>
+  <p:clrMapOvr>
+    <a:masterClrMapping/>
+  </p:clrMapOvr>
+</p:sld>
+</file>
+
+<file path=ppt/slides/slide8.xml><?xml version="1.0" encoding="utf-8"?>
+<p:sld xmlns:a="http://schemas.openxmlformats.org/drawingml/2006/main" xmlns:r="http://schemas.openxmlformats.org/officeDocument/2006/relationships" xmlns:p="http://schemas.openxmlformats.org/presentationml/2006/main">
+  <p:cSld>
+    <p:spTree>
+      <p:nvGrpSpPr>
+        <p:cNvPr id="1" name=""/>
+        <p:cNvGrpSpPr/>
+        <p:nvPr/>
+      </p:nvGrpSpPr>
+      <p:grpSpPr>
+        <a:xfrm>
+          <a:off x="0" y="0"/>
+          <a:ext cx="0" cy="0"/>
+          <a:chOff x="0" y="0"/>
+          <a:chExt cx="0" cy="0"/>
+        </a:xfrm>
+      </p:grpSpPr>
+      <p:grpSp>
+        <p:nvGrpSpPr>
+          <p:cNvPr id="4" name="Group 3"/>
+          <p:cNvGrpSpPr/>
+          <p:nvPr/>
+        </p:nvGrpSpPr>
+        <p:grpSpPr>
+          <a:xfrm>
+            <a:off x="800153" y="2177641"/>
+            <a:ext cx="6551146" cy="3418902"/>
+            <a:chOff x="800153" y="2177641"/>
+            <a:chExt cx="6551146" cy="3418902"/>
+          </a:xfrm>
+        </p:grpSpPr>
+        <p:sp>
+          <p:nvSpPr>
+            <p:cNvPr id="3" name="TextBox 2"/>
+            <p:cNvSpPr txBox="1"/>
+            <p:nvPr/>
+          </p:nvSpPr>
+          <p:spPr>
+            <a:xfrm>
+              <a:off x="1289874" y="3962400"/>
+              <a:ext cx="2880000" cy="979069"/>
+            </a:xfrm>
+            <a:prstGeom prst="rect">
+              <a:avLst/>
+            </a:prstGeom>
+            <a:solidFill>
+              <a:schemeClr val="accent3"/>
+            </a:solidFill>
+            <a:ln>
+              <a:solidFill>
+                <a:schemeClr val="tx1"/>
+              </a:solidFill>
+            </a:ln>
+          </p:spPr>
+          <p:txBody>
+            <a:bodyPr wrap="square" tIns="180000" bIns="180000" rtlCol="0">
+              <a:spAutoFit/>
+            </a:bodyPr>
+            <a:lstStyle/>
+            <a:p>
+              <a:pPr algn="ctr"/>
+              <a:r>
+                <a:rPr lang="en-US" sz="2000" dirty="0" smtClean="0">
+                  <a:latin typeface="Helvetica" charset="0"/>
+                  <a:ea typeface="Helvetica" charset="0"/>
+                  <a:cs typeface="Helvetica" charset="0"/>
+                </a:rPr>
+                <a:t>Instantiate</a:t>
+              </a:r>
+            </a:p>
+            <a:p>
+              <a:pPr algn="ctr"/>
+              <a:r>
+                <a:rPr lang="en-US" sz="2000" dirty="0" smtClean="0">
+                  <a:latin typeface="Helvetica" charset="0"/>
+                  <a:ea typeface="Helvetica" charset="0"/>
+                  <a:cs typeface="Helvetica" charset="0"/>
+                </a:rPr>
+                <a:t>Representations</a:t>
+              </a:r>
+              <a:endParaRPr lang="en-US" sz="2000" dirty="0">
+                <a:latin typeface="Helvetica" charset="0"/>
+                <a:ea typeface="Helvetica" charset="0"/>
+                <a:cs typeface="Helvetica" charset="0"/>
+              </a:endParaRPr>
+            </a:p>
+          </p:txBody>
+        </p:sp>
+        <p:sp>
+          <p:nvSpPr>
+            <p:cNvPr id="2" name="TextBox 1"/>
+            <p:cNvSpPr txBox="1"/>
+            <p:nvPr/>
+          </p:nvSpPr>
+          <p:spPr>
+            <a:xfrm>
+              <a:off x="1284350" y="2177641"/>
+              <a:ext cx="2880000" cy="979069"/>
+            </a:xfrm>
+            <a:prstGeom prst="rect">
+              <a:avLst/>
+            </a:prstGeom>
+            <a:solidFill>
+              <a:schemeClr val="accent5">
+                <a:lumMod val="60000"/>
+                <a:lumOff val="40000"/>
+              </a:schemeClr>
+            </a:solidFill>
+            <a:ln>
+              <a:solidFill>
+                <a:schemeClr val="tx1"/>
+              </a:solidFill>
+            </a:ln>
+          </p:spPr>
+          <p:txBody>
+            <a:bodyPr wrap="square" lIns="72000" tIns="180000" rIns="90000" bIns="180000" rtlCol="0">
+              <a:spAutoFit/>
+            </a:bodyPr>
+            <a:lstStyle/>
+            <a:p>
+              <a:pPr algn="ctr"/>
+              <a:r>
+                <a:rPr lang="en-US" sz="2000" dirty="0" smtClean="0">
+                  <a:latin typeface="Helvetica" charset="0"/>
+                  <a:ea typeface="Helvetica" charset="0"/>
+                  <a:cs typeface="Helvetica" charset="0"/>
+                </a:rPr>
+                <a:t>Search for Good Representations</a:t>
+              </a:r>
+              <a:endParaRPr lang="en-US" sz="2000" dirty="0">
+                <a:latin typeface="Helvetica" charset="0"/>
+                <a:ea typeface="Helvetica" charset="0"/>
+                <a:cs typeface="Helvetica" charset="0"/>
+              </a:endParaRPr>
+            </a:p>
+          </p:txBody>
+        </p:sp>
+        <p:cxnSp>
+          <p:nvCxnSpPr>
+            <p:cNvPr id="5" name="Elbow Connector 4"/>
+            <p:cNvCxnSpPr>
+              <a:stCxn id="2" idx="1"/>
+              <a:endCxn id="3" idx="1"/>
+            </p:cNvCxnSpPr>
+            <p:nvPr/>
+          </p:nvCxnSpPr>
+          <p:spPr>
+            <a:xfrm rot="10800000" flipH="1" flipV="1">
+              <a:off x="1282674" y="2667175"/>
+              <a:ext cx="7200" cy="1784759"/>
+            </a:xfrm>
+            <a:prstGeom prst="bentConnector3">
+              <a:avLst>
+                <a:gd name="adj1" fmla="val -7260735"/>
+              </a:avLst>
+            </a:prstGeom>
+            <a:ln w="19050">
+              <a:solidFill>
+                <a:schemeClr val="tx1"/>
+              </a:solidFill>
+              <a:tailEnd type="stealth"/>
+            </a:ln>
+          </p:spPr>
+          <p:style>
+            <a:lnRef idx="1">
+              <a:schemeClr val="accent1"/>
+            </a:lnRef>
+            <a:fillRef idx="0">
+              <a:schemeClr val="accent1"/>
+            </a:fillRef>
+            <a:effectRef idx="0">
+              <a:schemeClr val="accent1"/>
+            </a:effectRef>
+            <a:fontRef idx="minor">
+              <a:schemeClr val="tx1"/>
+            </a:fontRef>
+          </p:style>
+        </p:cxnSp>
+        <p:sp>
+          <p:nvSpPr>
+            <p:cNvPr id="15" name="TextBox 14"/>
+            <p:cNvSpPr txBox="1"/>
+            <p:nvPr/>
+          </p:nvSpPr>
+          <p:spPr>
+            <a:xfrm>
+              <a:off x="800153" y="3318973"/>
+              <a:ext cx="2052165" cy="400110"/>
+            </a:xfrm>
+            <a:prstGeom prst="rect">
+              <a:avLst/>
+            </a:prstGeom>
+            <a:noFill/>
+          </p:spPr>
+          <p:txBody>
+            <a:bodyPr wrap="none" rtlCol="0">
+              <a:spAutoFit/>
+            </a:bodyPr>
+            <a:lstStyle/>
+            <a:p>
+              <a:r>
+                <a:rPr lang="en-US" sz="2000" dirty="0" smtClean="0">
+                  <a:latin typeface="Helvetica" charset="0"/>
+                  <a:ea typeface="Helvetica" charset="0"/>
+                  <a:cs typeface="Helvetica" charset="0"/>
+                </a:rPr>
+                <a:t>Representations</a:t>
+              </a:r>
+              <a:endParaRPr lang="en-US" sz="2000" dirty="0">
+                <a:latin typeface="Helvetica" charset="0"/>
+                <a:ea typeface="Helvetica" charset="0"/>
+                <a:cs typeface="Helvetica" charset="0"/>
+              </a:endParaRPr>
+            </a:p>
+          </p:txBody>
+        </p:sp>
+        <p:sp>
+          <p:nvSpPr>
+            <p:cNvPr id="21" name="TextBox 20"/>
+            <p:cNvSpPr txBox="1"/>
+            <p:nvPr/>
+          </p:nvSpPr>
+          <p:spPr>
+            <a:xfrm>
+              <a:off x="3444768" y="3318973"/>
+              <a:ext cx="1127232" cy="400110"/>
+            </a:xfrm>
+            <a:prstGeom prst="rect">
+              <a:avLst/>
+            </a:prstGeom>
+            <a:noFill/>
+          </p:spPr>
+          <p:txBody>
+            <a:bodyPr wrap="none" rtlCol="0">
+              <a:spAutoFit/>
+            </a:bodyPr>
+            <a:lstStyle/>
+            <a:p>
+              <a:r>
+                <a:rPr lang="en-US" sz="2000" dirty="0" smtClean="0">
+                  <a:solidFill>
+                    <a:srgbClr val="FF0000"/>
+                  </a:solidFill>
+                  <a:latin typeface="Helvetica" charset="0"/>
+                  <a:ea typeface="Helvetica" charset="0"/>
+                  <a:cs typeface="Helvetica" charset="0"/>
+                </a:rPr>
+                <a:t>Residue</a:t>
+              </a:r>
+              <a:endParaRPr lang="en-US" sz="2000" dirty="0">
+                <a:solidFill>
+                  <a:srgbClr val="FF0000"/>
+                </a:solidFill>
+                <a:latin typeface="Helvetica" charset="0"/>
+                <a:ea typeface="Helvetica" charset="0"/>
+                <a:cs typeface="Helvetica" charset="0"/>
+              </a:endParaRPr>
+            </a:p>
+          </p:txBody>
+        </p:sp>
+        <p:cxnSp>
+          <p:nvCxnSpPr>
+            <p:cNvPr id="28" name="Elbow Connector 27"/>
+            <p:cNvCxnSpPr/>
+            <p:nvPr/>
+          </p:nvCxnSpPr>
+          <p:spPr>
+            <a:xfrm flipH="1">
+              <a:off x="4169546" y="2933121"/>
+              <a:ext cx="7200" cy="1260000"/>
+            </a:xfrm>
+            <a:prstGeom prst="bentConnector3">
+              <a:avLst>
+                <a:gd name="adj1" fmla="val -6166516"/>
+              </a:avLst>
+            </a:prstGeom>
+            <a:ln w="19050">
+              <a:solidFill>
+                <a:srgbClr val="FF0000"/>
+              </a:solidFill>
+              <a:headEnd type="stealth"/>
+              <a:tailEnd type="none"/>
+            </a:ln>
+          </p:spPr>
+          <p:style>
+            <a:lnRef idx="1">
+              <a:schemeClr val="accent1"/>
+            </a:lnRef>
+            <a:fillRef idx="0">
+              <a:schemeClr val="accent1"/>
+            </a:fillRef>
+            <a:effectRef idx="0">
+              <a:schemeClr val="accent1"/>
+            </a:effectRef>
+            <a:fontRef idx="minor">
+              <a:schemeClr val="tx1"/>
+            </a:fontRef>
+          </p:style>
+        </p:cxnSp>
+        <p:cxnSp>
+          <p:nvCxnSpPr>
+            <p:cNvPr id="47" name="Elbow Connector 46"/>
+            <p:cNvCxnSpPr/>
+            <p:nvPr/>
+          </p:nvCxnSpPr>
+          <p:spPr>
+            <a:xfrm flipH="1">
+              <a:off x="4158661" y="2384987"/>
+              <a:ext cx="7200" cy="288000"/>
+            </a:xfrm>
+            <a:prstGeom prst="bentConnector3">
+              <a:avLst>
+                <a:gd name="adj1" fmla="val -6166516"/>
+              </a:avLst>
+            </a:prstGeom>
+            <a:ln w="19050">
+              <a:solidFill>
+                <a:schemeClr val="accent5">
+                  <a:lumMod val="60000"/>
+                  <a:lumOff val="40000"/>
+                </a:schemeClr>
+              </a:solidFill>
+              <a:headEnd type="stealth"/>
+              <a:tailEnd type="none"/>
+            </a:ln>
+          </p:spPr>
+          <p:style>
+            <a:lnRef idx="1">
+              <a:schemeClr val="accent1"/>
+            </a:lnRef>
+            <a:fillRef idx="0">
+              <a:schemeClr val="accent1"/>
+            </a:fillRef>
+            <a:effectRef idx="0">
+              <a:schemeClr val="accent1"/>
+            </a:effectRef>
+            <a:fontRef idx="minor">
+              <a:schemeClr val="tx1"/>
+            </a:fontRef>
+          </p:style>
+        </p:cxnSp>
+        <p:sp>
+          <p:nvSpPr>
+            <p:cNvPr id="49" name="TextBox 48"/>
+            <p:cNvSpPr txBox="1"/>
+            <p:nvPr/>
+          </p:nvSpPr>
+          <p:spPr>
+            <a:xfrm>
+              <a:off x="5029028" y="2291577"/>
+              <a:ext cx="2093843" cy="400110"/>
+            </a:xfrm>
+            <a:prstGeom prst="rect">
+              <a:avLst/>
+            </a:prstGeom>
+            <a:noFill/>
+          </p:spPr>
+          <p:txBody>
+            <a:bodyPr wrap="none" rtlCol="0">
+              <a:spAutoFit/>
+            </a:bodyPr>
+            <a:lstStyle/>
+            <a:p>
+              <a:r>
+                <a:rPr lang="en-US" sz="2000" dirty="0" smtClean="0">
+                  <a:latin typeface="Helvetica" charset="0"/>
+                  <a:ea typeface="Helvetica" charset="0"/>
+                  <a:cs typeface="Helvetica" charset="0"/>
+                </a:rPr>
+                <a:t>Generation Loop</a:t>
+              </a:r>
+              <a:endParaRPr lang="en-US" sz="2000" dirty="0">
+                <a:latin typeface="Helvetica" charset="0"/>
+                <a:ea typeface="Helvetica" charset="0"/>
+                <a:cs typeface="Helvetica" charset="0"/>
+              </a:endParaRPr>
+            </a:p>
+          </p:txBody>
+        </p:sp>
+        <p:sp>
+          <p:nvSpPr>
+            <p:cNvPr id="50" name="TextBox 49"/>
+            <p:cNvSpPr txBox="1"/>
+            <p:nvPr/>
+          </p:nvSpPr>
+          <p:spPr>
+            <a:xfrm>
+              <a:off x="5013799" y="3165085"/>
+              <a:ext cx="2124300" cy="707886"/>
+            </a:xfrm>
+            <a:prstGeom prst="rect">
+              <a:avLst/>
+            </a:prstGeom>
+            <a:noFill/>
+          </p:spPr>
+          <p:txBody>
+            <a:bodyPr wrap="none" rtlCol="0">
+              <a:spAutoFit/>
+            </a:bodyPr>
+            <a:lstStyle/>
+            <a:p>
+              <a:pPr algn="ctr"/>
+              <a:r>
+                <a:rPr lang="en-US" sz="2000" dirty="0" smtClean="0">
+                  <a:latin typeface="Helvetica" charset="0"/>
+                  <a:ea typeface="Helvetica" charset="0"/>
+                  <a:cs typeface="Helvetica" charset="0"/>
+                </a:rPr>
+                <a:t>Representational</a:t>
+              </a:r>
+            </a:p>
+            <a:p>
+              <a:pPr algn="ctr"/>
+              <a:r>
+                <a:rPr lang="en-US" sz="2000" dirty="0" smtClean="0">
+                  <a:latin typeface="Helvetica" charset="0"/>
+                  <a:ea typeface="Helvetica" charset="0"/>
+                  <a:cs typeface="Helvetica" charset="0"/>
+                </a:rPr>
+                <a:t>Shift Loop</a:t>
+              </a:r>
+              <a:endParaRPr lang="en-US" sz="2000" dirty="0">
+                <a:latin typeface="Helvetica" charset="0"/>
+                <a:ea typeface="Helvetica" charset="0"/>
+                <a:cs typeface="Helvetica" charset="0"/>
+              </a:endParaRPr>
+            </a:p>
+          </p:txBody>
+        </p:sp>
+        <p:sp>
+          <p:nvSpPr>
+            <p:cNvPr id="51" name="TextBox 50"/>
+            <p:cNvSpPr txBox="1"/>
+            <p:nvPr/>
+          </p:nvSpPr>
+          <p:spPr>
+            <a:xfrm>
+              <a:off x="4800600" y="4414718"/>
+              <a:ext cx="2550699" cy="400110"/>
+            </a:xfrm>
+            <a:prstGeom prst="rect">
+              <a:avLst/>
+            </a:prstGeom>
+            <a:noFill/>
+          </p:spPr>
+          <p:txBody>
+            <a:bodyPr wrap="none" rtlCol="0">
+              <a:spAutoFit/>
+            </a:bodyPr>
+            <a:lstStyle/>
+            <a:p>
+              <a:pPr algn="ctr"/>
+              <a:r>
+                <a:rPr lang="en-US" sz="2000" smtClean="0">
+                  <a:latin typeface="Helvetica" charset="0"/>
+                  <a:ea typeface="Helvetica" charset="0"/>
+                  <a:cs typeface="Helvetica" charset="0"/>
+                </a:rPr>
+                <a:t>Data Coverage Loop</a:t>
+              </a:r>
+              <a:endParaRPr lang="en-US" sz="2000" dirty="0">
+                <a:latin typeface="Helvetica" charset="0"/>
+                <a:ea typeface="Helvetica" charset="0"/>
+                <a:cs typeface="Helvetica" charset="0"/>
+              </a:endParaRPr>
+            </a:p>
+          </p:txBody>
+        </p:sp>
+        <p:cxnSp>
+          <p:nvCxnSpPr>
+            <p:cNvPr id="56" name="Straight Arrow Connector 55"/>
+            <p:cNvCxnSpPr/>
+            <p:nvPr/>
+          </p:nvCxnSpPr>
+          <p:spPr>
+            <a:xfrm>
+              <a:off x="2694050" y="4800600"/>
+              <a:ext cx="0" cy="441212"/>
+            </a:xfrm>
+            <a:prstGeom prst="straightConnector1">
+              <a:avLst/>
+            </a:prstGeom>
+            <a:ln w="19050">
+              <a:solidFill>
+                <a:schemeClr val="tx1"/>
+              </a:solidFill>
+              <a:tailEnd type="stealth"/>
+            </a:ln>
+          </p:spPr>
+          <p:style>
+            <a:lnRef idx="1">
+              <a:schemeClr val="accent1"/>
+            </a:lnRef>
+            <a:fillRef idx="0">
+              <a:schemeClr val="accent1"/>
+            </a:fillRef>
+            <a:effectRef idx="0">
+              <a:schemeClr val="accent1"/>
+            </a:effectRef>
+            <a:fontRef idx="minor">
+              <a:schemeClr val="tx1"/>
+            </a:fontRef>
+          </p:style>
+        </p:cxnSp>
+        <p:cxnSp>
+          <p:nvCxnSpPr>
+            <p:cNvPr id="57" name="Straight Arrow Connector 56"/>
+            <p:cNvCxnSpPr/>
+            <p:nvPr/>
+          </p:nvCxnSpPr>
+          <p:spPr>
+            <a:xfrm flipV="1">
+              <a:off x="2852318" y="4800600"/>
+              <a:ext cx="0" cy="441212"/>
+            </a:xfrm>
+            <a:prstGeom prst="straightConnector1">
+              <a:avLst/>
+            </a:prstGeom>
+            <a:ln w="19050">
+              <a:solidFill>
+                <a:schemeClr val="tx1"/>
+              </a:solidFill>
+              <a:tailEnd type="stealth"/>
+            </a:ln>
+          </p:spPr>
+          <p:style>
+            <a:lnRef idx="1">
+              <a:schemeClr val="accent1"/>
+            </a:lnRef>
+            <a:fillRef idx="0">
+              <a:schemeClr val="accent1"/>
+            </a:fillRef>
+            <a:effectRef idx="0">
+              <a:schemeClr val="accent1"/>
+            </a:effectRef>
+            <a:fontRef idx="minor">
+              <a:schemeClr val="tx1"/>
+            </a:fontRef>
+          </p:style>
+        </p:cxnSp>
+        <p:sp>
+          <p:nvSpPr>
+            <p:cNvPr id="60" name="Oval 59"/>
+            <p:cNvSpPr>
+              <a:spLocks noChangeAspect="1"/>
+            </p:cNvSpPr>
+            <p:nvPr/>
+          </p:nvSpPr>
+          <p:spPr>
+            <a:xfrm>
+              <a:off x="2047823" y="5128543"/>
+              <a:ext cx="1353053" cy="468000"/>
+            </a:xfrm>
+            <a:prstGeom prst="ellipse">
+              <a:avLst/>
+            </a:prstGeom>
+            <a:noFill/>
+            <a:ln w="12700">
+              <a:solidFill>
+                <a:schemeClr val="tx1"/>
+              </a:solidFill>
+            </a:ln>
+          </p:spPr>
+          <p:style>
+            <a:lnRef idx="2">
+              <a:schemeClr val="accent1">
+                <a:shade val="50000"/>
+              </a:schemeClr>
+            </a:lnRef>
+            <a:fillRef idx="1">
+              <a:schemeClr val="accent1"/>
+            </a:fillRef>
+            <a:effectRef idx="0">
+              <a:schemeClr val="accent1"/>
+            </a:effectRef>
+            <a:fontRef idx="minor">
+              <a:schemeClr val="lt1"/>
+            </a:fontRef>
+          </p:style>
+          <p:txBody>
+            <a:bodyPr lIns="180000" tIns="180000" rIns="180000" bIns="180000" rtlCol="0" anchor="ctr" anchorCtr="0">
+              <a:noAutofit/>
+            </a:bodyPr>
+            <a:lstStyle/>
+            <a:p>
+              <a:pPr algn="ctr"/>
+              <a:r>
+                <a:rPr lang="en-US" sz="2000" dirty="0" smtClean="0">
+                  <a:solidFill>
+                    <a:schemeClr val="tx1"/>
+                  </a:solidFill>
+                  <a:latin typeface="Helvetica" charset="0"/>
+                  <a:ea typeface="Helvetica" charset="0"/>
+                  <a:cs typeface="Helvetica" charset="0"/>
+                </a:rPr>
+                <a:t>task</a:t>
+              </a:r>
+              <a:endParaRPr lang="en-US" sz="2000" dirty="0">
+                <a:solidFill>
+                  <a:schemeClr val="tx1"/>
+                </a:solidFill>
+                <a:latin typeface="Helvetica" charset="0"/>
+                <a:ea typeface="Helvetica" charset="0"/>
+                <a:cs typeface="Helvetica" charset="0"/>
+              </a:endParaRPr>
+            </a:p>
+          </p:txBody>
+        </p:sp>
+        <p:cxnSp>
+          <p:nvCxnSpPr>
+            <p:cNvPr id="48" name="Elbow Connector 47"/>
+            <p:cNvCxnSpPr/>
+            <p:nvPr/>
+          </p:nvCxnSpPr>
+          <p:spPr>
+            <a:xfrm flipH="1">
+              <a:off x="4167110" y="4495800"/>
+              <a:ext cx="7200" cy="288000"/>
+            </a:xfrm>
+            <a:prstGeom prst="bentConnector3">
+              <a:avLst>
+                <a:gd name="adj1" fmla="val -6031964"/>
+              </a:avLst>
+            </a:prstGeom>
+            <a:ln w="19050">
+              <a:solidFill>
+                <a:schemeClr val="accent3"/>
+              </a:solidFill>
+              <a:headEnd type="stealth"/>
+              <a:tailEnd type="none"/>
+            </a:ln>
+          </p:spPr>
+          <p:style>
+            <a:lnRef idx="1">
+              <a:schemeClr val="accent1"/>
+            </a:lnRef>
+            <a:fillRef idx="0">
+              <a:schemeClr val="accent1"/>
+            </a:fillRef>
+            <a:effectRef idx="0">
+              <a:schemeClr val="accent1"/>
+            </a:effectRef>
+            <a:fontRef idx="minor">
+              <a:schemeClr val="tx1"/>
+            </a:fontRef>
+          </p:style>
+        </p:cxnSp>
+      </p:grpSp>
+    </p:spTree>
+    <p:extLst>
+      <p:ext uri="{BB962C8B-B14F-4D97-AF65-F5344CB8AC3E}">
+        <p14:creationId xmlns:p14="http://schemas.microsoft.com/office/powerpoint/2010/main" val="1950304169"/>
+      </p:ext>
+    </p:extLst>
+  </p:cSld>
+  <p:clrMapOvr>
+    <a:masterClrMapping/>
+  </p:clrMapOvr>
+  <p:timing>
+    <p:tnLst>
+      <p:par>
+        <p:cTn id="1" dur="indefinite" restart="never" nodeType="tmRoot"/>
+      </p:par>
+    </p:tnLst>
+  </p:timing>
+</p:sld>
+</file>
+
 <file path=ppt/theme/theme1.xml><?xml version="1.0" encoding="utf-8"?>
 <a:theme xmlns:a="http://schemas.openxmlformats.org/drawingml/2006/main" name="Office Theme">
   <a:themeElements>

</xml_diff>

<commit_message>
a few more images
</commit_message>
<xml_diff>
--- a/Figs/figures.pptx
+++ b/Figs/figures.pptx
@@ -14,6 +14,8 @@
     <p:sldId id="274" r:id="rId8"/>
     <p:sldId id="275" r:id="rId9"/>
     <p:sldId id="276" r:id="rId10"/>
+    <p:sldId id="277" r:id="rId11"/>
+    <p:sldId id="278" r:id="rId12"/>
   </p:sldIdLst>
   <p:sldSz cx="9144000" cy="6858000" type="screen4x3"/>
   <p:notesSz cx="6858000" cy="9144000"/>
@@ -8089,6 +8091,3024 @@
       </p:par>
     </p:tnLst>
   </p:timing>
+</p:sld>
+</file>
+
+<file path=ppt/slides/slide10.xml><?xml version="1.0" encoding="utf-8"?>
+<p:sld xmlns:a="http://schemas.openxmlformats.org/drawingml/2006/main" xmlns:r="http://schemas.openxmlformats.org/officeDocument/2006/relationships" xmlns:p="http://schemas.openxmlformats.org/presentationml/2006/main">
+  <p:cSld>
+    <p:spTree>
+      <p:nvGrpSpPr>
+        <p:cNvPr id="1" name=""/>
+        <p:cNvGrpSpPr/>
+        <p:nvPr/>
+      </p:nvGrpSpPr>
+      <p:grpSpPr>
+        <a:xfrm>
+          <a:off x="0" y="0"/>
+          <a:ext cx="0" cy="0"/>
+          <a:chOff x="0" y="0"/>
+          <a:chExt cx="0" cy="0"/>
+        </a:xfrm>
+      </p:grpSpPr>
+      <p:sp>
+        <p:nvSpPr>
+          <p:cNvPr id="50" name="Rectangle 49"/>
+          <p:cNvSpPr/>
+          <p:nvPr/>
+        </p:nvSpPr>
+        <p:spPr>
+          <a:xfrm>
+            <a:off x="1358900" y="1143000"/>
+            <a:ext cx="1384300" cy="1600200"/>
+          </a:xfrm>
+          <a:prstGeom prst="rect">
+            <a:avLst/>
+          </a:prstGeom>
+          <a:ln w="12700">
+            <a:solidFill>
+              <a:schemeClr val="bg1">
+                <a:lumMod val="50000"/>
+              </a:schemeClr>
+            </a:solidFill>
+          </a:ln>
+        </p:spPr>
+        <p:style>
+          <a:lnRef idx="2">
+            <a:schemeClr val="dk1"/>
+          </a:lnRef>
+          <a:fillRef idx="1">
+            <a:schemeClr val="lt1"/>
+          </a:fillRef>
+          <a:effectRef idx="0">
+            <a:schemeClr val="dk1"/>
+          </a:effectRef>
+          <a:fontRef idx="minor">
+            <a:schemeClr val="dk1"/>
+          </a:fontRef>
+        </p:style>
+        <p:txBody>
+          <a:bodyPr rtlCol="0" anchor="ctr"/>
+          <a:lstStyle/>
+          <a:p>
+            <a:pPr algn="ctr"/>
+            <a:endParaRPr lang="en-US" dirty="0"/>
+          </a:p>
+        </p:txBody>
+      </p:sp>
+      <p:sp>
+        <p:nvSpPr>
+          <p:cNvPr id="2" name="Oval 1"/>
+          <p:cNvSpPr/>
+          <p:nvPr/>
+        </p:nvSpPr>
+        <p:spPr>
+          <a:xfrm>
+            <a:off x="1447800" y="1219200"/>
+            <a:ext cx="304800" cy="304800"/>
+          </a:xfrm>
+          <a:prstGeom prst="ellipse">
+            <a:avLst/>
+          </a:prstGeom>
+          <a:solidFill>
+            <a:schemeClr val="accent6"/>
+          </a:solidFill>
+          <a:ln>
+            <a:noFill/>
+          </a:ln>
+        </p:spPr>
+        <p:style>
+          <a:lnRef idx="2">
+            <a:schemeClr val="accent1">
+              <a:shade val="50000"/>
+            </a:schemeClr>
+          </a:lnRef>
+          <a:fillRef idx="1">
+            <a:schemeClr val="accent1"/>
+          </a:fillRef>
+          <a:effectRef idx="0">
+            <a:schemeClr val="accent1"/>
+          </a:effectRef>
+          <a:fontRef idx="minor">
+            <a:schemeClr val="lt1"/>
+          </a:fontRef>
+        </p:style>
+        <p:txBody>
+          <a:bodyPr rtlCol="0" anchor="ctr"/>
+          <a:lstStyle/>
+          <a:p>
+            <a:pPr algn="ctr"/>
+            <a:endParaRPr lang="en-US" dirty="0"/>
+          </a:p>
+        </p:txBody>
+      </p:sp>
+      <p:sp>
+        <p:nvSpPr>
+          <p:cNvPr id="3" name="Oval 2"/>
+          <p:cNvSpPr/>
+          <p:nvPr/>
+        </p:nvSpPr>
+        <p:spPr>
+          <a:xfrm>
+            <a:off x="1447800" y="1600200"/>
+            <a:ext cx="304800" cy="304800"/>
+          </a:xfrm>
+          <a:prstGeom prst="ellipse">
+            <a:avLst/>
+          </a:prstGeom>
+          <a:solidFill>
+            <a:schemeClr val="accent6"/>
+          </a:solidFill>
+          <a:ln>
+            <a:noFill/>
+          </a:ln>
+        </p:spPr>
+        <p:style>
+          <a:lnRef idx="2">
+            <a:schemeClr val="accent1">
+              <a:shade val="50000"/>
+            </a:schemeClr>
+          </a:lnRef>
+          <a:fillRef idx="1">
+            <a:schemeClr val="accent1"/>
+          </a:fillRef>
+          <a:effectRef idx="0">
+            <a:schemeClr val="accent1"/>
+          </a:effectRef>
+          <a:fontRef idx="minor">
+            <a:schemeClr val="lt1"/>
+          </a:fontRef>
+        </p:style>
+        <p:txBody>
+          <a:bodyPr rtlCol="0" anchor="ctr"/>
+          <a:lstStyle/>
+          <a:p>
+            <a:pPr algn="ctr"/>
+            <a:endParaRPr lang="en-US" dirty="0"/>
+          </a:p>
+        </p:txBody>
+      </p:sp>
+      <p:sp>
+        <p:nvSpPr>
+          <p:cNvPr id="4" name="Oval 3"/>
+          <p:cNvSpPr/>
+          <p:nvPr/>
+        </p:nvSpPr>
+        <p:spPr>
+          <a:xfrm>
+            <a:off x="1447800" y="1981200"/>
+            <a:ext cx="304800" cy="304800"/>
+          </a:xfrm>
+          <a:prstGeom prst="ellipse">
+            <a:avLst/>
+          </a:prstGeom>
+          <a:solidFill>
+            <a:schemeClr val="accent6"/>
+          </a:solidFill>
+          <a:ln>
+            <a:noFill/>
+          </a:ln>
+        </p:spPr>
+        <p:style>
+          <a:lnRef idx="2">
+            <a:schemeClr val="accent1">
+              <a:shade val="50000"/>
+            </a:schemeClr>
+          </a:lnRef>
+          <a:fillRef idx="1">
+            <a:schemeClr val="accent1"/>
+          </a:fillRef>
+          <a:effectRef idx="0">
+            <a:schemeClr val="accent1"/>
+          </a:effectRef>
+          <a:fontRef idx="minor">
+            <a:schemeClr val="lt1"/>
+          </a:fontRef>
+        </p:style>
+        <p:txBody>
+          <a:bodyPr rtlCol="0" anchor="ctr"/>
+          <a:lstStyle/>
+          <a:p>
+            <a:pPr algn="ctr"/>
+            <a:endParaRPr lang="en-US" dirty="0"/>
+          </a:p>
+        </p:txBody>
+      </p:sp>
+      <p:sp>
+        <p:nvSpPr>
+          <p:cNvPr id="5" name="Oval 4"/>
+          <p:cNvSpPr/>
+          <p:nvPr/>
+        </p:nvSpPr>
+        <p:spPr>
+          <a:xfrm>
+            <a:off x="1447800" y="2362200"/>
+            <a:ext cx="304800" cy="304800"/>
+          </a:xfrm>
+          <a:prstGeom prst="ellipse">
+            <a:avLst/>
+          </a:prstGeom>
+          <a:solidFill>
+            <a:schemeClr val="accent6"/>
+          </a:solidFill>
+          <a:ln>
+            <a:noFill/>
+          </a:ln>
+        </p:spPr>
+        <p:style>
+          <a:lnRef idx="2">
+            <a:schemeClr val="accent1">
+              <a:shade val="50000"/>
+            </a:schemeClr>
+          </a:lnRef>
+          <a:fillRef idx="1">
+            <a:schemeClr val="accent1"/>
+          </a:fillRef>
+          <a:effectRef idx="0">
+            <a:schemeClr val="accent1"/>
+          </a:effectRef>
+          <a:fontRef idx="minor">
+            <a:schemeClr val="lt1"/>
+          </a:fontRef>
+        </p:style>
+        <p:txBody>
+          <a:bodyPr rtlCol="0" anchor="ctr"/>
+          <a:lstStyle/>
+          <a:p>
+            <a:pPr algn="ctr"/>
+            <a:endParaRPr lang="en-US" dirty="0"/>
+          </a:p>
+        </p:txBody>
+      </p:sp>
+      <p:sp>
+        <p:nvSpPr>
+          <p:cNvPr id="6" name="Oval 5"/>
+          <p:cNvSpPr/>
+          <p:nvPr/>
+        </p:nvSpPr>
+        <p:spPr>
+          <a:xfrm>
+            <a:off x="1905000" y="1219200"/>
+            <a:ext cx="304800" cy="304800"/>
+          </a:xfrm>
+          <a:prstGeom prst="ellipse">
+            <a:avLst/>
+          </a:prstGeom>
+          <a:solidFill>
+            <a:schemeClr val="accent6"/>
+          </a:solidFill>
+          <a:ln>
+            <a:noFill/>
+          </a:ln>
+        </p:spPr>
+        <p:style>
+          <a:lnRef idx="2">
+            <a:schemeClr val="accent1">
+              <a:shade val="50000"/>
+            </a:schemeClr>
+          </a:lnRef>
+          <a:fillRef idx="1">
+            <a:schemeClr val="accent1"/>
+          </a:fillRef>
+          <a:effectRef idx="0">
+            <a:schemeClr val="accent1"/>
+          </a:effectRef>
+          <a:fontRef idx="minor">
+            <a:schemeClr val="lt1"/>
+          </a:fontRef>
+        </p:style>
+        <p:txBody>
+          <a:bodyPr rtlCol="0" anchor="ctr"/>
+          <a:lstStyle/>
+          <a:p>
+            <a:pPr algn="ctr"/>
+            <a:endParaRPr lang="en-US" dirty="0"/>
+          </a:p>
+        </p:txBody>
+      </p:sp>
+      <p:sp>
+        <p:nvSpPr>
+          <p:cNvPr id="7" name="Oval 6"/>
+          <p:cNvSpPr/>
+          <p:nvPr/>
+        </p:nvSpPr>
+        <p:spPr>
+          <a:xfrm>
+            <a:off x="1905000" y="1600200"/>
+            <a:ext cx="304800" cy="304800"/>
+          </a:xfrm>
+          <a:prstGeom prst="ellipse">
+            <a:avLst/>
+          </a:prstGeom>
+          <a:solidFill>
+            <a:schemeClr val="accent6"/>
+          </a:solidFill>
+          <a:ln>
+            <a:noFill/>
+          </a:ln>
+        </p:spPr>
+        <p:style>
+          <a:lnRef idx="2">
+            <a:schemeClr val="accent1">
+              <a:shade val="50000"/>
+            </a:schemeClr>
+          </a:lnRef>
+          <a:fillRef idx="1">
+            <a:schemeClr val="accent1"/>
+          </a:fillRef>
+          <a:effectRef idx="0">
+            <a:schemeClr val="accent1"/>
+          </a:effectRef>
+          <a:fontRef idx="minor">
+            <a:schemeClr val="lt1"/>
+          </a:fontRef>
+        </p:style>
+        <p:txBody>
+          <a:bodyPr rtlCol="0" anchor="ctr"/>
+          <a:lstStyle/>
+          <a:p>
+            <a:pPr algn="ctr"/>
+            <a:endParaRPr lang="en-US" dirty="0"/>
+          </a:p>
+        </p:txBody>
+      </p:sp>
+      <p:sp>
+        <p:nvSpPr>
+          <p:cNvPr id="8" name="Oval 7"/>
+          <p:cNvSpPr/>
+          <p:nvPr/>
+        </p:nvSpPr>
+        <p:spPr>
+          <a:xfrm>
+            <a:off x="1905000" y="1981200"/>
+            <a:ext cx="304800" cy="304800"/>
+          </a:xfrm>
+          <a:prstGeom prst="ellipse">
+            <a:avLst/>
+          </a:prstGeom>
+          <a:solidFill>
+            <a:schemeClr val="accent6"/>
+          </a:solidFill>
+          <a:ln>
+            <a:noFill/>
+          </a:ln>
+        </p:spPr>
+        <p:style>
+          <a:lnRef idx="2">
+            <a:schemeClr val="accent1">
+              <a:shade val="50000"/>
+            </a:schemeClr>
+          </a:lnRef>
+          <a:fillRef idx="1">
+            <a:schemeClr val="accent1"/>
+          </a:fillRef>
+          <a:effectRef idx="0">
+            <a:schemeClr val="accent1"/>
+          </a:effectRef>
+          <a:fontRef idx="minor">
+            <a:schemeClr val="lt1"/>
+          </a:fontRef>
+        </p:style>
+        <p:txBody>
+          <a:bodyPr rtlCol="0" anchor="ctr"/>
+          <a:lstStyle/>
+          <a:p>
+            <a:pPr algn="ctr"/>
+            <a:endParaRPr lang="en-US" dirty="0"/>
+          </a:p>
+        </p:txBody>
+      </p:sp>
+      <p:sp>
+        <p:nvSpPr>
+          <p:cNvPr id="9" name="Oval 8"/>
+          <p:cNvSpPr/>
+          <p:nvPr/>
+        </p:nvSpPr>
+        <p:spPr>
+          <a:xfrm>
+            <a:off x="1905000" y="2362200"/>
+            <a:ext cx="304800" cy="304800"/>
+          </a:xfrm>
+          <a:prstGeom prst="ellipse">
+            <a:avLst/>
+          </a:prstGeom>
+          <a:solidFill>
+            <a:schemeClr val="accent6"/>
+          </a:solidFill>
+          <a:ln>
+            <a:noFill/>
+          </a:ln>
+        </p:spPr>
+        <p:style>
+          <a:lnRef idx="2">
+            <a:schemeClr val="accent1">
+              <a:shade val="50000"/>
+            </a:schemeClr>
+          </a:lnRef>
+          <a:fillRef idx="1">
+            <a:schemeClr val="accent1"/>
+          </a:fillRef>
+          <a:effectRef idx="0">
+            <a:schemeClr val="accent1"/>
+          </a:effectRef>
+          <a:fontRef idx="minor">
+            <a:schemeClr val="lt1"/>
+          </a:fontRef>
+        </p:style>
+        <p:txBody>
+          <a:bodyPr rtlCol="0" anchor="ctr"/>
+          <a:lstStyle/>
+          <a:p>
+            <a:pPr algn="ctr"/>
+            <a:endParaRPr lang="en-US" dirty="0"/>
+          </a:p>
+        </p:txBody>
+      </p:sp>
+      <p:sp>
+        <p:nvSpPr>
+          <p:cNvPr id="10" name="Oval 9"/>
+          <p:cNvSpPr/>
+          <p:nvPr/>
+        </p:nvSpPr>
+        <p:spPr>
+          <a:xfrm>
+            <a:off x="2362200" y="1219200"/>
+            <a:ext cx="304800" cy="304800"/>
+          </a:xfrm>
+          <a:prstGeom prst="ellipse">
+            <a:avLst/>
+          </a:prstGeom>
+          <a:solidFill>
+            <a:schemeClr val="accent6"/>
+          </a:solidFill>
+          <a:ln>
+            <a:noFill/>
+          </a:ln>
+        </p:spPr>
+        <p:style>
+          <a:lnRef idx="2">
+            <a:schemeClr val="accent1">
+              <a:shade val="50000"/>
+            </a:schemeClr>
+          </a:lnRef>
+          <a:fillRef idx="1">
+            <a:schemeClr val="accent1"/>
+          </a:fillRef>
+          <a:effectRef idx="0">
+            <a:schemeClr val="accent1"/>
+          </a:effectRef>
+          <a:fontRef idx="minor">
+            <a:schemeClr val="lt1"/>
+          </a:fontRef>
+        </p:style>
+        <p:txBody>
+          <a:bodyPr rtlCol="0" anchor="ctr"/>
+          <a:lstStyle/>
+          <a:p>
+            <a:pPr algn="ctr"/>
+            <a:endParaRPr lang="en-US" dirty="0"/>
+          </a:p>
+        </p:txBody>
+      </p:sp>
+      <p:sp>
+        <p:nvSpPr>
+          <p:cNvPr id="11" name="Oval 10"/>
+          <p:cNvSpPr/>
+          <p:nvPr/>
+        </p:nvSpPr>
+        <p:spPr>
+          <a:xfrm>
+            <a:off x="2362200" y="1600200"/>
+            <a:ext cx="304800" cy="304800"/>
+          </a:xfrm>
+          <a:prstGeom prst="ellipse">
+            <a:avLst/>
+          </a:prstGeom>
+          <a:solidFill>
+            <a:schemeClr val="accent6"/>
+          </a:solidFill>
+          <a:ln>
+            <a:noFill/>
+          </a:ln>
+        </p:spPr>
+        <p:style>
+          <a:lnRef idx="2">
+            <a:schemeClr val="accent1">
+              <a:shade val="50000"/>
+            </a:schemeClr>
+          </a:lnRef>
+          <a:fillRef idx="1">
+            <a:schemeClr val="accent1"/>
+          </a:fillRef>
+          <a:effectRef idx="0">
+            <a:schemeClr val="accent1"/>
+          </a:effectRef>
+          <a:fontRef idx="minor">
+            <a:schemeClr val="lt1"/>
+          </a:fontRef>
+        </p:style>
+        <p:txBody>
+          <a:bodyPr rtlCol="0" anchor="ctr"/>
+          <a:lstStyle/>
+          <a:p>
+            <a:pPr algn="ctr"/>
+            <a:endParaRPr lang="en-US" dirty="0"/>
+          </a:p>
+        </p:txBody>
+      </p:sp>
+      <p:sp>
+        <p:nvSpPr>
+          <p:cNvPr id="12" name="Oval 11"/>
+          <p:cNvSpPr/>
+          <p:nvPr/>
+        </p:nvSpPr>
+        <p:spPr>
+          <a:xfrm>
+            <a:off x="2362200" y="1981200"/>
+            <a:ext cx="304800" cy="304800"/>
+          </a:xfrm>
+          <a:prstGeom prst="ellipse">
+            <a:avLst/>
+          </a:prstGeom>
+          <a:solidFill>
+            <a:schemeClr val="accent6"/>
+          </a:solidFill>
+          <a:ln>
+            <a:noFill/>
+          </a:ln>
+        </p:spPr>
+        <p:style>
+          <a:lnRef idx="2">
+            <a:schemeClr val="accent1">
+              <a:shade val="50000"/>
+            </a:schemeClr>
+          </a:lnRef>
+          <a:fillRef idx="1">
+            <a:schemeClr val="accent1"/>
+          </a:fillRef>
+          <a:effectRef idx="0">
+            <a:schemeClr val="accent1"/>
+          </a:effectRef>
+          <a:fontRef idx="minor">
+            <a:schemeClr val="lt1"/>
+          </a:fontRef>
+        </p:style>
+        <p:txBody>
+          <a:bodyPr rtlCol="0" anchor="ctr"/>
+          <a:lstStyle/>
+          <a:p>
+            <a:pPr algn="ctr"/>
+            <a:endParaRPr lang="en-US" dirty="0"/>
+          </a:p>
+        </p:txBody>
+      </p:sp>
+      <p:sp>
+        <p:nvSpPr>
+          <p:cNvPr id="13" name="Oval 12"/>
+          <p:cNvSpPr/>
+          <p:nvPr/>
+        </p:nvSpPr>
+        <p:spPr>
+          <a:xfrm>
+            <a:off x="2362200" y="2362200"/>
+            <a:ext cx="304800" cy="304800"/>
+          </a:xfrm>
+          <a:prstGeom prst="ellipse">
+            <a:avLst/>
+          </a:prstGeom>
+          <a:solidFill>
+            <a:schemeClr val="accent6"/>
+          </a:solidFill>
+          <a:ln>
+            <a:noFill/>
+          </a:ln>
+        </p:spPr>
+        <p:style>
+          <a:lnRef idx="2">
+            <a:schemeClr val="accent1">
+              <a:shade val="50000"/>
+            </a:schemeClr>
+          </a:lnRef>
+          <a:fillRef idx="1">
+            <a:schemeClr val="accent1"/>
+          </a:fillRef>
+          <a:effectRef idx="0">
+            <a:schemeClr val="accent1"/>
+          </a:effectRef>
+          <a:fontRef idx="minor">
+            <a:schemeClr val="lt1"/>
+          </a:fontRef>
+        </p:style>
+        <p:txBody>
+          <a:bodyPr rtlCol="0" anchor="ctr"/>
+          <a:lstStyle/>
+          <a:p>
+            <a:pPr algn="ctr"/>
+            <a:endParaRPr lang="en-US" dirty="0"/>
+          </a:p>
+        </p:txBody>
+      </p:sp>
+      <p:sp>
+        <p:nvSpPr>
+          <p:cNvPr id="14" name="Oval 13"/>
+          <p:cNvSpPr/>
+          <p:nvPr/>
+        </p:nvSpPr>
+        <p:spPr>
+          <a:xfrm>
+            <a:off x="2819400" y="1219200"/>
+            <a:ext cx="304800" cy="304800"/>
+          </a:xfrm>
+          <a:prstGeom prst="ellipse">
+            <a:avLst/>
+          </a:prstGeom>
+          <a:solidFill>
+            <a:schemeClr val="accent6"/>
+          </a:solidFill>
+          <a:ln>
+            <a:noFill/>
+          </a:ln>
+        </p:spPr>
+        <p:style>
+          <a:lnRef idx="2">
+            <a:schemeClr val="accent1">
+              <a:shade val="50000"/>
+            </a:schemeClr>
+          </a:lnRef>
+          <a:fillRef idx="1">
+            <a:schemeClr val="accent1"/>
+          </a:fillRef>
+          <a:effectRef idx="0">
+            <a:schemeClr val="accent1"/>
+          </a:effectRef>
+          <a:fontRef idx="minor">
+            <a:schemeClr val="lt1"/>
+          </a:fontRef>
+        </p:style>
+        <p:txBody>
+          <a:bodyPr rtlCol="0" anchor="ctr"/>
+          <a:lstStyle/>
+          <a:p>
+            <a:pPr algn="ctr"/>
+            <a:endParaRPr lang="en-US" dirty="0"/>
+          </a:p>
+        </p:txBody>
+      </p:sp>
+      <p:sp>
+        <p:nvSpPr>
+          <p:cNvPr id="15" name="Oval 14"/>
+          <p:cNvSpPr/>
+          <p:nvPr/>
+        </p:nvSpPr>
+        <p:spPr>
+          <a:xfrm>
+            <a:off x="2819400" y="1600200"/>
+            <a:ext cx="304800" cy="304800"/>
+          </a:xfrm>
+          <a:prstGeom prst="ellipse">
+            <a:avLst/>
+          </a:prstGeom>
+          <a:solidFill>
+            <a:schemeClr val="accent6"/>
+          </a:solidFill>
+          <a:ln>
+            <a:noFill/>
+          </a:ln>
+        </p:spPr>
+        <p:style>
+          <a:lnRef idx="2">
+            <a:schemeClr val="accent1">
+              <a:shade val="50000"/>
+            </a:schemeClr>
+          </a:lnRef>
+          <a:fillRef idx="1">
+            <a:schemeClr val="accent1"/>
+          </a:fillRef>
+          <a:effectRef idx="0">
+            <a:schemeClr val="accent1"/>
+          </a:effectRef>
+          <a:fontRef idx="minor">
+            <a:schemeClr val="lt1"/>
+          </a:fontRef>
+        </p:style>
+        <p:txBody>
+          <a:bodyPr rtlCol="0" anchor="ctr"/>
+          <a:lstStyle/>
+          <a:p>
+            <a:pPr algn="ctr"/>
+            <a:endParaRPr lang="en-US" dirty="0"/>
+          </a:p>
+        </p:txBody>
+      </p:sp>
+      <p:sp>
+        <p:nvSpPr>
+          <p:cNvPr id="16" name="Oval 15"/>
+          <p:cNvSpPr/>
+          <p:nvPr/>
+        </p:nvSpPr>
+        <p:spPr>
+          <a:xfrm>
+            <a:off x="2819400" y="1981200"/>
+            <a:ext cx="304800" cy="304800"/>
+          </a:xfrm>
+          <a:prstGeom prst="ellipse">
+            <a:avLst/>
+          </a:prstGeom>
+          <a:solidFill>
+            <a:schemeClr val="accent6"/>
+          </a:solidFill>
+          <a:ln>
+            <a:noFill/>
+          </a:ln>
+        </p:spPr>
+        <p:style>
+          <a:lnRef idx="2">
+            <a:schemeClr val="accent1">
+              <a:shade val="50000"/>
+            </a:schemeClr>
+          </a:lnRef>
+          <a:fillRef idx="1">
+            <a:schemeClr val="accent1"/>
+          </a:fillRef>
+          <a:effectRef idx="0">
+            <a:schemeClr val="accent1"/>
+          </a:effectRef>
+          <a:fontRef idx="minor">
+            <a:schemeClr val="lt1"/>
+          </a:fontRef>
+        </p:style>
+        <p:txBody>
+          <a:bodyPr rtlCol="0" anchor="ctr"/>
+          <a:lstStyle/>
+          <a:p>
+            <a:pPr algn="ctr"/>
+            <a:endParaRPr lang="en-US" dirty="0"/>
+          </a:p>
+        </p:txBody>
+      </p:sp>
+      <p:sp>
+        <p:nvSpPr>
+          <p:cNvPr id="17" name="Oval 16"/>
+          <p:cNvSpPr/>
+          <p:nvPr/>
+        </p:nvSpPr>
+        <p:spPr>
+          <a:xfrm>
+            <a:off x="2819400" y="2362200"/>
+            <a:ext cx="304800" cy="304800"/>
+          </a:xfrm>
+          <a:prstGeom prst="ellipse">
+            <a:avLst/>
+          </a:prstGeom>
+          <a:solidFill>
+            <a:schemeClr val="accent6"/>
+          </a:solidFill>
+          <a:ln>
+            <a:noFill/>
+          </a:ln>
+        </p:spPr>
+        <p:style>
+          <a:lnRef idx="2">
+            <a:schemeClr val="accent1">
+              <a:shade val="50000"/>
+            </a:schemeClr>
+          </a:lnRef>
+          <a:fillRef idx="1">
+            <a:schemeClr val="accent1"/>
+          </a:fillRef>
+          <a:effectRef idx="0">
+            <a:schemeClr val="accent1"/>
+          </a:effectRef>
+          <a:fontRef idx="minor">
+            <a:schemeClr val="lt1"/>
+          </a:fontRef>
+        </p:style>
+        <p:txBody>
+          <a:bodyPr rtlCol="0" anchor="ctr"/>
+          <a:lstStyle/>
+          <a:p>
+            <a:pPr algn="ctr"/>
+            <a:endParaRPr lang="en-US" dirty="0"/>
+          </a:p>
+        </p:txBody>
+      </p:sp>
+      <p:sp>
+        <p:nvSpPr>
+          <p:cNvPr id="18" name="Oval 17"/>
+          <p:cNvSpPr/>
+          <p:nvPr/>
+        </p:nvSpPr>
+        <p:spPr>
+          <a:xfrm>
+            <a:off x="3276600" y="1219200"/>
+            <a:ext cx="304800" cy="304800"/>
+          </a:xfrm>
+          <a:prstGeom prst="ellipse">
+            <a:avLst/>
+          </a:prstGeom>
+          <a:solidFill>
+            <a:schemeClr val="accent6"/>
+          </a:solidFill>
+          <a:ln>
+            <a:noFill/>
+          </a:ln>
+        </p:spPr>
+        <p:style>
+          <a:lnRef idx="2">
+            <a:schemeClr val="accent1">
+              <a:shade val="50000"/>
+            </a:schemeClr>
+          </a:lnRef>
+          <a:fillRef idx="1">
+            <a:schemeClr val="accent1"/>
+          </a:fillRef>
+          <a:effectRef idx="0">
+            <a:schemeClr val="accent1"/>
+          </a:effectRef>
+          <a:fontRef idx="minor">
+            <a:schemeClr val="lt1"/>
+          </a:fontRef>
+        </p:style>
+        <p:txBody>
+          <a:bodyPr rtlCol="0" anchor="ctr"/>
+          <a:lstStyle/>
+          <a:p>
+            <a:pPr algn="ctr"/>
+            <a:endParaRPr lang="en-US" dirty="0"/>
+          </a:p>
+        </p:txBody>
+      </p:sp>
+      <p:sp>
+        <p:nvSpPr>
+          <p:cNvPr id="19" name="Oval 18"/>
+          <p:cNvSpPr/>
+          <p:nvPr/>
+        </p:nvSpPr>
+        <p:spPr>
+          <a:xfrm>
+            <a:off x="3276600" y="1600200"/>
+            <a:ext cx="304800" cy="304800"/>
+          </a:xfrm>
+          <a:prstGeom prst="ellipse">
+            <a:avLst/>
+          </a:prstGeom>
+          <a:solidFill>
+            <a:schemeClr val="accent6"/>
+          </a:solidFill>
+          <a:ln>
+            <a:noFill/>
+          </a:ln>
+        </p:spPr>
+        <p:style>
+          <a:lnRef idx="2">
+            <a:schemeClr val="accent1">
+              <a:shade val="50000"/>
+            </a:schemeClr>
+          </a:lnRef>
+          <a:fillRef idx="1">
+            <a:schemeClr val="accent1"/>
+          </a:fillRef>
+          <a:effectRef idx="0">
+            <a:schemeClr val="accent1"/>
+          </a:effectRef>
+          <a:fontRef idx="minor">
+            <a:schemeClr val="lt1"/>
+          </a:fontRef>
+        </p:style>
+        <p:txBody>
+          <a:bodyPr rtlCol="0" anchor="ctr"/>
+          <a:lstStyle/>
+          <a:p>
+            <a:pPr algn="ctr"/>
+            <a:endParaRPr lang="en-US" dirty="0"/>
+          </a:p>
+        </p:txBody>
+      </p:sp>
+      <p:sp>
+        <p:nvSpPr>
+          <p:cNvPr id="20" name="Oval 19"/>
+          <p:cNvSpPr/>
+          <p:nvPr/>
+        </p:nvSpPr>
+        <p:spPr>
+          <a:xfrm>
+            <a:off x="3276600" y="1981200"/>
+            <a:ext cx="304800" cy="304800"/>
+          </a:xfrm>
+          <a:prstGeom prst="ellipse">
+            <a:avLst/>
+          </a:prstGeom>
+          <a:solidFill>
+            <a:schemeClr val="accent6"/>
+          </a:solidFill>
+          <a:ln>
+            <a:noFill/>
+          </a:ln>
+        </p:spPr>
+        <p:style>
+          <a:lnRef idx="2">
+            <a:schemeClr val="accent1">
+              <a:shade val="50000"/>
+            </a:schemeClr>
+          </a:lnRef>
+          <a:fillRef idx="1">
+            <a:schemeClr val="accent1"/>
+          </a:fillRef>
+          <a:effectRef idx="0">
+            <a:schemeClr val="accent1"/>
+          </a:effectRef>
+          <a:fontRef idx="minor">
+            <a:schemeClr val="lt1"/>
+          </a:fontRef>
+        </p:style>
+        <p:txBody>
+          <a:bodyPr rtlCol="0" anchor="ctr"/>
+          <a:lstStyle/>
+          <a:p>
+            <a:pPr algn="ctr"/>
+            <a:endParaRPr lang="en-US" dirty="0"/>
+          </a:p>
+        </p:txBody>
+      </p:sp>
+      <p:sp>
+        <p:nvSpPr>
+          <p:cNvPr id="21" name="Oval 20"/>
+          <p:cNvSpPr/>
+          <p:nvPr/>
+        </p:nvSpPr>
+        <p:spPr>
+          <a:xfrm>
+            <a:off x="3276600" y="2362200"/>
+            <a:ext cx="304800" cy="304800"/>
+          </a:xfrm>
+          <a:prstGeom prst="ellipse">
+            <a:avLst/>
+          </a:prstGeom>
+          <a:solidFill>
+            <a:schemeClr val="accent6"/>
+          </a:solidFill>
+          <a:ln>
+            <a:noFill/>
+          </a:ln>
+        </p:spPr>
+        <p:style>
+          <a:lnRef idx="2">
+            <a:schemeClr val="accent1">
+              <a:shade val="50000"/>
+            </a:schemeClr>
+          </a:lnRef>
+          <a:fillRef idx="1">
+            <a:schemeClr val="accent1"/>
+          </a:fillRef>
+          <a:effectRef idx="0">
+            <a:schemeClr val="accent1"/>
+          </a:effectRef>
+          <a:fontRef idx="minor">
+            <a:schemeClr val="lt1"/>
+          </a:fontRef>
+        </p:style>
+        <p:txBody>
+          <a:bodyPr rtlCol="0" anchor="ctr"/>
+          <a:lstStyle/>
+          <a:p>
+            <a:pPr algn="ctr"/>
+            <a:endParaRPr lang="en-US" dirty="0"/>
+          </a:p>
+        </p:txBody>
+      </p:sp>
+      <p:sp>
+        <p:nvSpPr>
+          <p:cNvPr id="22" name="Oval 21"/>
+          <p:cNvSpPr/>
+          <p:nvPr/>
+        </p:nvSpPr>
+        <p:spPr>
+          <a:xfrm>
+            <a:off x="3733800" y="1219200"/>
+            <a:ext cx="304800" cy="304800"/>
+          </a:xfrm>
+          <a:prstGeom prst="ellipse">
+            <a:avLst/>
+          </a:prstGeom>
+          <a:solidFill>
+            <a:schemeClr val="accent6"/>
+          </a:solidFill>
+          <a:ln>
+            <a:noFill/>
+          </a:ln>
+        </p:spPr>
+        <p:style>
+          <a:lnRef idx="2">
+            <a:schemeClr val="accent1">
+              <a:shade val="50000"/>
+            </a:schemeClr>
+          </a:lnRef>
+          <a:fillRef idx="1">
+            <a:schemeClr val="accent1"/>
+          </a:fillRef>
+          <a:effectRef idx="0">
+            <a:schemeClr val="accent1"/>
+          </a:effectRef>
+          <a:fontRef idx="minor">
+            <a:schemeClr val="lt1"/>
+          </a:fontRef>
+        </p:style>
+        <p:txBody>
+          <a:bodyPr rtlCol="0" anchor="ctr"/>
+          <a:lstStyle/>
+          <a:p>
+            <a:pPr algn="ctr"/>
+            <a:endParaRPr lang="en-US" dirty="0"/>
+          </a:p>
+        </p:txBody>
+      </p:sp>
+      <p:sp>
+        <p:nvSpPr>
+          <p:cNvPr id="23" name="Oval 22"/>
+          <p:cNvSpPr/>
+          <p:nvPr/>
+        </p:nvSpPr>
+        <p:spPr>
+          <a:xfrm>
+            <a:off x="3733800" y="1600200"/>
+            <a:ext cx="304800" cy="304800"/>
+          </a:xfrm>
+          <a:prstGeom prst="ellipse">
+            <a:avLst/>
+          </a:prstGeom>
+          <a:solidFill>
+            <a:schemeClr val="accent6"/>
+          </a:solidFill>
+          <a:ln>
+            <a:noFill/>
+          </a:ln>
+        </p:spPr>
+        <p:style>
+          <a:lnRef idx="2">
+            <a:schemeClr val="accent1">
+              <a:shade val="50000"/>
+            </a:schemeClr>
+          </a:lnRef>
+          <a:fillRef idx="1">
+            <a:schemeClr val="accent1"/>
+          </a:fillRef>
+          <a:effectRef idx="0">
+            <a:schemeClr val="accent1"/>
+          </a:effectRef>
+          <a:fontRef idx="minor">
+            <a:schemeClr val="lt1"/>
+          </a:fontRef>
+        </p:style>
+        <p:txBody>
+          <a:bodyPr rtlCol="0" anchor="ctr"/>
+          <a:lstStyle/>
+          <a:p>
+            <a:pPr algn="ctr"/>
+            <a:endParaRPr lang="en-US" dirty="0"/>
+          </a:p>
+        </p:txBody>
+      </p:sp>
+      <p:sp>
+        <p:nvSpPr>
+          <p:cNvPr id="24" name="Oval 23"/>
+          <p:cNvSpPr/>
+          <p:nvPr/>
+        </p:nvSpPr>
+        <p:spPr>
+          <a:xfrm>
+            <a:off x="3733800" y="1981200"/>
+            <a:ext cx="304800" cy="304800"/>
+          </a:xfrm>
+          <a:prstGeom prst="ellipse">
+            <a:avLst/>
+          </a:prstGeom>
+          <a:solidFill>
+            <a:schemeClr val="accent6"/>
+          </a:solidFill>
+          <a:ln>
+            <a:noFill/>
+          </a:ln>
+        </p:spPr>
+        <p:style>
+          <a:lnRef idx="2">
+            <a:schemeClr val="accent1">
+              <a:shade val="50000"/>
+            </a:schemeClr>
+          </a:lnRef>
+          <a:fillRef idx="1">
+            <a:schemeClr val="accent1"/>
+          </a:fillRef>
+          <a:effectRef idx="0">
+            <a:schemeClr val="accent1"/>
+          </a:effectRef>
+          <a:fontRef idx="minor">
+            <a:schemeClr val="lt1"/>
+          </a:fontRef>
+        </p:style>
+        <p:txBody>
+          <a:bodyPr rtlCol="0" anchor="ctr"/>
+          <a:lstStyle/>
+          <a:p>
+            <a:pPr algn="ctr"/>
+            <a:endParaRPr lang="en-US" dirty="0"/>
+          </a:p>
+        </p:txBody>
+      </p:sp>
+      <p:sp>
+        <p:nvSpPr>
+          <p:cNvPr id="25" name="Oval 24"/>
+          <p:cNvSpPr/>
+          <p:nvPr/>
+        </p:nvSpPr>
+        <p:spPr>
+          <a:xfrm>
+            <a:off x="3733800" y="2362200"/>
+            <a:ext cx="304800" cy="304800"/>
+          </a:xfrm>
+          <a:prstGeom prst="ellipse">
+            <a:avLst/>
+          </a:prstGeom>
+          <a:solidFill>
+            <a:schemeClr val="accent6"/>
+          </a:solidFill>
+          <a:ln>
+            <a:noFill/>
+          </a:ln>
+        </p:spPr>
+        <p:style>
+          <a:lnRef idx="2">
+            <a:schemeClr val="accent1">
+              <a:shade val="50000"/>
+            </a:schemeClr>
+          </a:lnRef>
+          <a:fillRef idx="1">
+            <a:schemeClr val="accent1"/>
+          </a:fillRef>
+          <a:effectRef idx="0">
+            <a:schemeClr val="accent1"/>
+          </a:effectRef>
+          <a:fontRef idx="minor">
+            <a:schemeClr val="lt1"/>
+          </a:fontRef>
+        </p:style>
+        <p:txBody>
+          <a:bodyPr rtlCol="0" anchor="ctr"/>
+          <a:lstStyle/>
+          <a:p>
+            <a:pPr algn="ctr"/>
+            <a:endParaRPr lang="en-US" dirty="0"/>
+          </a:p>
+        </p:txBody>
+      </p:sp>
+      <p:grpSp>
+        <p:nvGrpSpPr>
+          <p:cNvPr id="67" name="Group 66"/>
+          <p:cNvGrpSpPr/>
+          <p:nvPr/>
+        </p:nvGrpSpPr>
+        <p:grpSpPr>
+          <a:xfrm>
+            <a:off x="1358900" y="4114800"/>
+            <a:ext cx="2590800" cy="304800"/>
+            <a:chOff x="1358900" y="4114800"/>
+            <a:chExt cx="2590800" cy="304800"/>
+          </a:xfrm>
+        </p:grpSpPr>
+        <p:sp>
+          <p:nvSpPr>
+            <p:cNvPr id="55" name="Oval 54"/>
+            <p:cNvSpPr/>
+            <p:nvPr/>
+          </p:nvSpPr>
+          <p:spPr>
+            <a:xfrm>
+              <a:off x="2730500" y="4114800"/>
+              <a:ext cx="304800" cy="304800"/>
+            </a:xfrm>
+            <a:prstGeom prst="ellipse">
+              <a:avLst/>
+            </a:prstGeom>
+            <a:solidFill>
+              <a:schemeClr val="accent6"/>
+            </a:solidFill>
+            <a:ln>
+              <a:noFill/>
+            </a:ln>
+          </p:spPr>
+          <p:style>
+            <a:lnRef idx="2">
+              <a:schemeClr val="accent1">
+                <a:shade val="50000"/>
+              </a:schemeClr>
+            </a:lnRef>
+            <a:fillRef idx="1">
+              <a:schemeClr val="accent1"/>
+            </a:fillRef>
+            <a:effectRef idx="0">
+              <a:schemeClr val="accent1"/>
+            </a:effectRef>
+            <a:fontRef idx="minor">
+              <a:schemeClr val="lt1"/>
+            </a:fontRef>
+          </p:style>
+          <p:txBody>
+            <a:bodyPr rtlCol="0" anchor="ctr"/>
+            <a:lstStyle/>
+            <a:p>
+              <a:pPr algn="ctr"/>
+              <a:endParaRPr lang="en-US" dirty="0"/>
+            </a:p>
+          </p:txBody>
+        </p:sp>
+        <p:sp>
+          <p:nvSpPr>
+            <p:cNvPr id="56" name="Oval 55"/>
+            <p:cNvSpPr/>
+            <p:nvPr/>
+          </p:nvSpPr>
+          <p:spPr>
+            <a:xfrm>
+              <a:off x="3187700" y="4114800"/>
+              <a:ext cx="304800" cy="304800"/>
+            </a:xfrm>
+            <a:prstGeom prst="ellipse">
+              <a:avLst/>
+            </a:prstGeom>
+            <a:solidFill>
+              <a:schemeClr val="accent6"/>
+            </a:solidFill>
+            <a:ln>
+              <a:noFill/>
+            </a:ln>
+          </p:spPr>
+          <p:style>
+            <a:lnRef idx="2">
+              <a:schemeClr val="accent1">
+                <a:shade val="50000"/>
+              </a:schemeClr>
+            </a:lnRef>
+            <a:fillRef idx="1">
+              <a:schemeClr val="accent1"/>
+            </a:fillRef>
+            <a:effectRef idx="0">
+              <a:schemeClr val="accent1"/>
+            </a:effectRef>
+            <a:fontRef idx="minor">
+              <a:schemeClr val="lt1"/>
+            </a:fontRef>
+          </p:style>
+          <p:txBody>
+            <a:bodyPr rtlCol="0" anchor="ctr"/>
+            <a:lstStyle/>
+            <a:p>
+              <a:pPr algn="ctr"/>
+              <a:endParaRPr lang="en-US" dirty="0"/>
+            </a:p>
+          </p:txBody>
+        </p:sp>
+        <p:sp>
+          <p:nvSpPr>
+            <p:cNvPr id="57" name="Oval 56"/>
+            <p:cNvSpPr/>
+            <p:nvPr/>
+          </p:nvSpPr>
+          <p:spPr>
+            <a:xfrm>
+              <a:off x="3644900" y="4114800"/>
+              <a:ext cx="304800" cy="304800"/>
+            </a:xfrm>
+            <a:prstGeom prst="ellipse">
+              <a:avLst/>
+            </a:prstGeom>
+            <a:solidFill>
+              <a:schemeClr val="accent6"/>
+            </a:solidFill>
+            <a:ln>
+              <a:noFill/>
+            </a:ln>
+          </p:spPr>
+          <p:style>
+            <a:lnRef idx="2">
+              <a:schemeClr val="accent1">
+                <a:shade val="50000"/>
+              </a:schemeClr>
+            </a:lnRef>
+            <a:fillRef idx="1">
+              <a:schemeClr val="accent1"/>
+            </a:fillRef>
+            <a:effectRef idx="0">
+              <a:schemeClr val="accent1"/>
+            </a:effectRef>
+            <a:fontRef idx="minor">
+              <a:schemeClr val="lt1"/>
+            </a:fontRef>
+          </p:style>
+          <p:txBody>
+            <a:bodyPr rtlCol="0" anchor="ctr"/>
+            <a:lstStyle/>
+            <a:p>
+              <a:pPr algn="ctr"/>
+              <a:endParaRPr lang="en-US" dirty="0"/>
+            </a:p>
+          </p:txBody>
+        </p:sp>
+        <p:cxnSp>
+          <p:nvCxnSpPr>
+            <p:cNvPr id="59" name="Straight Connector 58"/>
+            <p:cNvCxnSpPr>
+              <a:stCxn id="52" idx="6"/>
+              <a:endCxn id="53" idx="2"/>
+            </p:cNvCxnSpPr>
+            <p:nvPr/>
+          </p:nvCxnSpPr>
+          <p:spPr>
+            <a:xfrm>
+              <a:off x="1663700" y="4267200"/>
+              <a:ext cx="152400" cy="0"/>
+            </a:xfrm>
+            <a:prstGeom prst="line">
+              <a:avLst/>
+            </a:prstGeom>
+            <a:ln w="25400">
+              <a:solidFill>
+                <a:schemeClr val="accent6"/>
+              </a:solidFill>
+            </a:ln>
+          </p:spPr>
+          <p:style>
+            <a:lnRef idx="1">
+              <a:schemeClr val="accent1"/>
+            </a:lnRef>
+            <a:fillRef idx="0">
+              <a:schemeClr val="accent1"/>
+            </a:fillRef>
+            <a:effectRef idx="0">
+              <a:schemeClr val="accent1"/>
+            </a:effectRef>
+            <a:fontRef idx="minor">
+              <a:schemeClr val="tx1"/>
+            </a:fontRef>
+          </p:style>
+        </p:cxnSp>
+        <p:cxnSp>
+          <p:nvCxnSpPr>
+            <p:cNvPr id="62" name="Straight Connector 61"/>
+            <p:cNvCxnSpPr>
+              <a:stCxn id="53" idx="6"/>
+              <a:endCxn id="54" idx="2"/>
+            </p:cNvCxnSpPr>
+            <p:nvPr/>
+          </p:nvCxnSpPr>
+          <p:spPr>
+            <a:xfrm>
+              <a:off x="2120900" y="4267200"/>
+              <a:ext cx="152400" cy="0"/>
+            </a:xfrm>
+            <a:prstGeom prst="line">
+              <a:avLst/>
+            </a:prstGeom>
+            <a:ln w="25400">
+              <a:solidFill>
+                <a:schemeClr val="accent6"/>
+              </a:solidFill>
+            </a:ln>
+          </p:spPr>
+          <p:style>
+            <a:lnRef idx="1">
+              <a:schemeClr val="accent1"/>
+            </a:lnRef>
+            <a:fillRef idx="0">
+              <a:schemeClr val="accent1"/>
+            </a:fillRef>
+            <a:effectRef idx="0">
+              <a:schemeClr val="accent1"/>
+            </a:effectRef>
+            <a:fontRef idx="minor">
+              <a:schemeClr val="tx1"/>
+            </a:fontRef>
+          </p:style>
+        </p:cxnSp>
+        <p:sp>
+          <p:nvSpPr>
+            <p:cNvPr id="52" name="Oval 51"/>
+            <p:cNvSpPr/>
+            <p:nvPr/>
+          </p:nvSpPr>
+          <p:spPr>
+            <a:xfrm>
+              <a:off x="1358900" y="4114800"/>
+              <a:ext cx="304800" cy="304800"/>
+            </a:xfrm>
+            <a:prstGeom prst="ellipse">
+              <a:avLst/>
+            </a:prstGeom>
+            <a:solidFill>
+              <a:schemeClr val="accent6"/>
+            </a:solidFill>
+            <a:ln>
+              <a:noFill/>
+            </a:ln>
+          </p:spPr>
+          <p:style>
+            <a:lnRef idx="2">
+              <a:schemeClr val="accent1">
+                <a:shade val="50000"/>
+              </a:schemeClr>
+            </a:lnRef>
+            <a:fillRef idx="1">
+              <a:schemeClr val="accent1"/>
+            </a:fillRef>
+            <a:effectRef idx="0">
+              <a:schemeClr val="accent1"/>
+            </a:effectRef>
+            <a:fontRef idx="minor">
+              <a:schemeClr val="lt1"/>
+            </a:fontRef>
+          </p:style>
+          <p:txBody>
+            <a:bodyPr rtlCol="0" anchor="ctr"/>
+            <a:lstStyle/>
+            <a:p>
+              <a:pPr algn="ctr"/>
+              <a:endParaRPr lang="en-US" dirty="0"/>
+            </a:p>
+          </p:txBody>
+        </p:sp>
+        <p:sp>
+          <p:nvSpPr>
+            <p:cNvPr id="53" name="Oval 52"/>
+            <p:cNvSpPr/>
+            <p:nvPr/>
+          </p:nvSpPr>
+          <p:spPr>
+            <a:xfrm>
+              <a:off x="1816100" y="4114800"/>
+              <a:ext cx="304800" cy="304800"/>
+            </a:xfrm>
+            <a:prstGeom prst="ellipse">
+              <a:avLst/>
+            </a:prstGeom>
+            <a:solidFill>
+              <a:schemeClr val="accent6"/>
+            </a:solidFill>
+            <a:ln>
+              <a:noFill/>
+            </a:ln>
+          </p:spPr>
+          <p:style>
+            <a:lnRef idx="2">
+              <a:schemeClr val="accent1">
+                <a:shade val="50000"/>
+              </a:schemeClr>
+            </a:lnRef>
+            <a:fillRef idx="1">
+              <a:schemeClr val="accent1"/>
+            </a:fillRef>
+            <a:effectRef idx="0">
+              <a:schemeClr val="accent1"/>
+            </a:effectRef>
+            <a:fontRef idx="minor">
+              <a:schemeClr val="lt1"/>
+            </a:fontRef>
+          </p:style>
+          <p:txBody>
+            <a:bodyPr rtlCol="0" anchor="ctr"/>
+            <a:lstStyle/>
+            <a:p>
+              <a:pPr algn="ctr"/>
+              <a:endParaRPr lang="en-US" dirty="0"/>
+            </a:p>
+          </p:txBody>
+        </p:sp>
+        <p:sp>
+          <p:nvSpPr>
+            <p:cNvPr id="54" name="Oval 53"/>
+            <p:cNvSpPr/>
+            <p:nvPr/>
+          </p:nvSpPr>
+          <p:spPr>
+            <a:xfrm>
+              <a:off x="2273300" y="4114800"/>
+              <a:ext cx="304800" cy="304800"/>
+            </a:xfrm>
+            <a:prstGeom prst="ellipse">
+              <a:avLst/>
+            </a:prstGeom>
+            <a:solidFill>
+              <a:schemeClr val="accent6"/>
+            </a:solidFill>
+            <a:ln>
+              <a:noFill/>
+            </a:ln>
+          </p:spPr>
+          <p:style>
+            <a:lnRef idx="2">
+              <a:schemeClr val="accent1">
+                <a:shade val="50000"/>
+              </a:schemeClr>
+            </a:lnRef>
+            <a:fillRef idx="1">
+              <a:schemeClr val="accent1"/>
+            </a:fillRef>
+            <a:effectRef idx="0">
+              <a:schemeClr val="accent1"/>
+            </a:effectRef>
+            <a:fontRef idx="minor">
+              <a:schemeClr val="lt1"/>
+            </a:fontRef>
+          </p:style>
+          <p:txBody>
+            <a:bodyPr rtlCol="0" anchor="ctr"/>
+            <a:lstStyle/>
+            <a:p>
+              <a:pPr algn="ctr"/>
+              <a:endParaRPr lang="en-US" dirty="0"/>
+            </a:p>
+          </p:txBody>
+        </p:sp>
+      </p:grpSp>
+      <p:grpSp>
+        <p:nvGrpSpPr>
+          <p:cNvPr id="104" name="Group 103"/>
+          <p:cNvGrpSpPr/>
+          <p:nvPr/>
+        </p:nvGrpSpPr>
+        <p:grpSpPr>
+          <a:xfrm>
+            <a:off x="4953000" y="2133600"/>
+            <a:ext cx="1828800" cy="838200"/>
+            <a:chOff x="4953000" y="2133600"/>
+            <a:chExt cx="1828800" cy="838200"/>
+          </a:xfrm>
+        </p:grpSpPr>
+        <p:sp>
+          <p:nvSpPr>
+            <p:cNvPr id="68" name="Oval 67"/>
+            <p:cNvSpPr/>
+            <p:nvPr/>
+          </p:nvSpPr>
+          <p:spPr>
+            <a:xfrm>
+              <a:off x="4953000" y="2133600"/>
+              <a:ext cx="304800" cy="304800"/>
+            </a:xfrm>
+            <a:prstGeom prst="ellipse">
+              <a:avLst/>
+            </a:prstGeom>
+            <a:solidFill>
+              <a:schemeClr val="tx1"/>
+            </a:solidFill>
+            <a:ln>
+              <a:noFill/>
+            </a:ln>
+          </p:spPr>
+          <p:style>
+            <a:lnRef idx="2">
+              <a:schemeClr val="accent1">
+                <a:shade val="50000"/>
+              </a:schemeClr>
+            </a:lnRef>
+            <a:fillRef idx="1">
+              <a:schemeClr val="accent1"/>
+            </a:fillRef>
+            <a:effectRef idx="0">
+              <a:schemeClr val="accent1"/>
+            </a:effectRef>
+            <a:fontRef idx="minor">
+              <a:schemeClr val="lt1"/>
+            </a:fontRef>
+          </p:style>
+          <p:txBody>
+            <a:bodyPr rtlCol="0" anchor="ctr"/>
+            <a:lstStyle/>
+            <a:p>
+              <a:pPr algn="ctr"/>
+              <a:endParaRPr lang="en-US" dirty="0"/>
+            </a:p>
+          </p:txBody>
+        </p:sp>
+        <p:sp>
+          <p:nvSpPr>
+            <p:cNvPr id="69" name="Oval 68"/>
+            <p:cNvSpPr/>
+            <p:nvPr/>
+          </p:nvSpPr>
+          <p:spPr>
+            <a:xfrm>
+              <a:off x="6477000" y="2133600"/>
+              <a:ext cx="304800" cy="304800"/>
+            </a:xfrm>
+            <a:prstGeom prst="ellipse">
+              <a:avLst/>
+            </a:prstGeom>
+            <a:solidFill>
+              <a:schemeClr val="tx1"/>
+            </a:solidFill>
+            <a:ln>
+              <a:noFill/>
+            </a:ln>
+          </p:spPr>
+          <p:style>
+            <a:lnRef idx="2">
+              <a:schemeClr val="accent1">
+                <a:shade val="50000"/>
+              </a:schemeClr>
+            </a:lnRef>
+            <a:fillRef idx="1">
+              <a:schemeClr val="accent1"/>
+            </a:fillRef>
+            <a:effectRef idx="0">
+              <a:schemeClr val="accent1"/>
+            </a:effectRef>
+            <a:fontRef idx="minor">
+              <a:schemeClr val="lt1"/>
+            </a:fontRef>
+          </p:style>
+          <p:txBody>
+            <a:bodyPr rtlCol="0" anchor="ctr"/>
+            <a:lstStyle/>
+            <a:p>
+              <a:pPr algn="ctr"/>
+              <a:endParaRPr lang="en-US" dirty="0"/>
+            </a:p>
+          </p:txBody>
+        </p:sp>
+        <p:sp>
+          <p:nvSpPr>
+            <p:cNvPr id="70" name="Oval 69"/>
+            <p:cNvSpPr/>
+            <p:nvPr/>
+          </p:nvSpPr>
+          <p:spPr>
+            <a:xfrm>
+              <a:off x="4953000" y="2667000"/>
+              <a:ext cx="304800" cy="304800"/>
+            </a:xfrm>
+            <a:prstGeom prst="ellipse">
+              <a:avLst/>
+            </a:prstGeom>
+            <a:solidFill>
+              <a:schemeClr val="tx1"/>
+            </a:solidFill>
+            <a:ln>
+              <a:noFill/>
+            </a:ln>
+          </p:spPr>
+          <p:style>
+            <a:lnRef idx="2">
+              <a:schemeClr val="accent1">
+                <a:shade val="50000"/>
+              </a:schemeClr>
+            </a:lnRef>
+            <a:fillRef idx="1">
+              <a:schemeClr val="accent1"/>
+            </a:fillRef>
+            <a:effectRef idx="0">
+              <a:schemeClr val="accent1"/>
+            </a:effectRef>
+            <a:fontRef idx="minor">
+              <a:schemeClr val="lt1"/>
+            </a:fontRef>
+          </p:style>
+          <p:txBody>
+            <a:bodyPr rtlCol="0" anchor="ctr"/>
+            <a:lstStyle/>
+            <a:p>
+              <a:pPr algn="ctr"/>
+              <a:endParaRPr lang="en-US" dirty="0"/>
+            </a:p>
+          </p:txBody>
+        </p:sp>
+        <p:sp>
+          <p:nvSpPr>
+            <p:cNvPr id="71" name="Oval 70"/>
+            <p:cNvSpPr/>
+            <p:nvPr/>
+          </p:nvSpPr>
+          <p:spPr>
+            <a:xfrm>
+              <a:off x="6477000" y="2667000"/>
+              <a:ext cx="304800" cy="304800"/>
+            </a:xfrm>
+            <a:prstGeom prst="ellipse">
+              <a:avLst/>
+            </a:prstGeom>
+            <a:solidFill>
+              <a:schemeClr val="tx1"/>
+            </a:solidFill>
+            <a:ln>
+              <a:noFill/>
+            </a:ln>
+          </p:spPr>
+          <p:style>
+            <a:lnRef idx="2">
+              <a:schemeClr val="accent1">
+                <a:shade val="50000"/>
+              </a:schemeClr>
+            </a:lnRef>
+            <a:fillRef idx="1">
+              <a:schemeClr val="accent1"/>
+            </a:fillRef>
+            <a:effectRef idx="0">
+              <a:schemeClr val="accent1"/>
+            </a:effectRef>
+            <a:fontRef idx="minor">
+              <a:schemeClr val="lt1"/>
+            </a:fontRef>
+          </p:style>
+          <p:txBody>
+            <a:bodyPr rtlCol="0" anchor="ctr"/>
+            <a:lstStyle/>
+            <a:p>
+              <a:pPr algn="ctr"/>
+              <a:endParaRPr lang="en-US" dirty="0"/>
+            </a:p>
+          </p:txBody>
+        </p:sp>
+        <p:cxnSp>
+          <p:nvCxnSpPr>
+            <p:cNvPr id="72" name="Straight Connector 71"/>
+            <p:cNvCxnSpPr>
+              <a:stCxn id="68" idx="6"/>
+              <a:endCxn id="69" idx="2"/>
+            </p:cNvCxnSpPr>
+            <p:nvPr/>
+          </p:nvCxnSpPr>
+          <p:spPr>
+            <a:xfrm>
+              <a:off x="5257800" y="2286000"/>
+              <a:ext cx="1219200" cy="0"/>
+            </a:xfrm>
+            <a:prstGeom prst="line">
+              <a:avLst/>
+            </a:prstGeom>
+            <a:ln w="25400">
+              <a:solidFill>
+                <a:schemeClr val="tx1"/>
+              </a:solidFill>
+            </a:ln>
+          </p:spPr>
+          <p:style>
+            <a:lnRef idx="1">
+              <a:schemeClr val="accent1"/>
+            </a:lnRef>
+            <a:fillRef idx="0">
+              <a:schemeClr val="accent1"/>
+            </a:fillRef>
+            <a:effectRef idx="0">
+              <a:schemeClr val="accent1"/>
+            </a:effectRef>
+            <a:fontRef idx="minor">
+              <a:schemeClr val="tx1"/>
+            </a:fontRef>
+          </p:style>
+        </p:cxnSp>
+        <p:cxnSp>
+          <p:nvCxnSpPr>
+            <p:cNvPr id="75" name="Straight Connector 74"/>
+            <p:cNvCxnSpPr>
+              <a:stCxn id="70" idx="6"/>
+              <a:endCxn id="71" idx="2"/>
+            </p:cNvCxnSpPr>
+            <p:nvPr/>
+          </p:nvCxnSpPr>
+          <p:spPr>
+            <a:xfrm>
+              <a:off x="5257800" y="2819400"/>
+              <a:ext cx="1219200" cy="0"/>
+            </a:xfrm>
+            <a:prstGeom prst="line">
+              <a:avLst/>
+            </a:prstGeom>
+            <a:ln w="25400">
+              <a:solidFill>
+                <a:schemeClr val="tx1"/>
+              </a:solidFill>
+            </a:ln>
+          </p:spPr>
+          <p:style>
+            <a:lnRef idx="1">
+              <a:schemeClr val="accent1"/>
+            </a:lnRef>
+            <a:fillRef idx="0">
+              <a:schemeClr val="accent1"/>
+            </a:fillRef>
+            <a:effectRef idx="0">
+              <a:schemeClr val="accent1"/>
+            </a:effectRef>
+            <a:fontRef idx="minor">
+              <a:schemeClr val="tx1"/>
+            </a:fontRef>
+          </p:style>
+        </p:cxnSp>
+      </p:grpSp>
+      <p:grpSp>
+        <p:nvGrpSpPr>
+          <p:cNvPr id="105" name="Group 104"/>
+          <p:cNvGrpSpPr/>
+          <p:nvPr/>
+        </p:nvGrpSpPr>
+        <p:grpSpPr>
+          <a:xfrm>
+            <a:off x="4953000" y="3572256"/>
+            <a:ext cx="914400" cy="838200"/>
+            <a:chOff x="4953000" y="3572256"/>
+            <a:chExt cx="914400" cy="838200"/>
+          </a:xfrm>
+        </p:grpSpPr>
+        <p:sp>
+          <p:nvSpPr>
+            <p:cNvPr id="84" name="Oval 83"/>
+            <p:cNvSpPr/>
+            <p:nvPr/>
+          </p:nvSpPr>
+          <p:spPr>
+            <a:xfrm>
+              <a:off x="4953000" y="3572256"/>
+              <a:ext cx="304800" cy="304800"/>
+            </a:xfrm>
+            <a:prstGeom prst="ellipse">
+              <a:avLst/>
+            </a:prstGeom>
+            <a:solidFill>
+              <a:schemeClr val="accent6"/>
+            </a:solidFill>
+            <a:ln>
+              <a:noFill/>
+            </a:ln>
+          </p:spPr>
+          <p:style>
+            <a:lnRef idx="2">
+              <a:schemeClr val="accent1">
+                <a:shade val="50000"/>
+              </a:schemeClr>
+            </a:lnRef>
+            <a:fillRef idx="1">
+              <a:schemeClr val="accent1"/>
+            </a:fillRef>
+            <a:effectRef idx="0">
+              <a:schemeClr val="accent1"/>
+            </a:effectRef>
+            <a:fontRef idx="minor">
+              <a:schemeClr val="lt1"/>
+            </a:fontRef>
+          </p:style>
+          <p:txBody>
+            <a:bodyPr rtlCol="0" anchor="ctr"/>
+            <a:lstStyle/>
+            <a:p>
+              <a:pPr algn="ctr"/>
+              <a:endParaRPr lang="en-US" dirty="0"/>
+            </a:p>
+          </p:txBody>
+        </p:sp>
+        <p:sp>
+          <p:nvSpPr>
+            <p:cNvPr id="85" name="Oval 84"/>
+            <p:cNvSpPr/>
+            <p:nvPr/>
+          </p:nvSpPr>
+          <p:spPr>
+            <a:xfrm>
+              <a:off x="5553456" y="3572256"/>
+              <a:ext cx="304800" cy="304800"/>
+            </a:xfrm>
+            <a:prstGeom prst="ellipse">
+              <a:avLst/>
+            </a:prstGeom>
+            <a:solidFill>
+              <a:schemeClr val="tx1"/>
+            </a:solidFill>
+            <a:ln>
+              <a:noFill/>
+            </a:ln>
+          </p:spPr>
+          <p:style>
+            <a:lnRef idx="2">
+              <a:schemeClr val="accent1">
+                <a:shade val="50000"/>
+              </a:schemeClr>
+            </a:lnRef>
+            <a:fillRef idx="1">
+              <a:schemeClr val="accent1"/>
+            </a:fillRef>
+            <a:effectRef idx="0">
+              <a:schemeClr val="accent1"/>
+            </a:effectRef>
+            <a:fontRef idx="minor">
+              <a:schemeClr val="lt1"/>
+            </a:fontRef>
+          </p:style>
+          <p:txBody>
+            <a:bodyPr rtlCol="0" anchor="ctr"/>
+            <a:lstStyle/>
+            <a:p>
+              <a:pPr algn="ctr"/>
+              <a:endParaRPr lang="en-US" dirty="0"/>
+            </a:p>
+          </p:txBody>
+        </p:sp>
+        <p:sp>
+          <p:nvSpPr>
+            <p:cNvPr id="86" name="Oval 85"/>
+            <p:cNvSpPr/>
+            <p:nvPr/>
+          </p:nvSpPr>
+          <p:spPr>
+            <a:xfrm>
+              <a:off x="4953000" y="4105656"/>
+              <a:ext cx="304800" cy="304800"/>
+            </a:xfrm>
+            <a:prstGeom prst="ellipse">
+              <a:avLst/>
+            </a:prstGeom>
+            <a:solidFill>
+              <a:schemeClr val="accent6"/>
+            </a:solidFill>
+            <a:ln>
+              <a:noFill/>
+            </a:ln>
+          </p:spPr>
+          <p:style>
+            <a:lnRef idx="2">
+              <a:schemeClr val="accent1">
+                <a:shade val="50000"/>
+              </a:schemeClr>
+            </a:lnRef>
+            <a:fillRef idx="1">
+              <a:schemeClr val="accent1"/>
+            </a:fillRef>
+            <a:effectRef idx="0">
+              <a:schemeClr val="accent1"/>
+            </a:effectRef>
+            <a:fontRef idx="minor">
+              <a:schemeClr val="lt1"/>
+            </a:fontRef>
+          </p:style>
+          <p:txBody>
+            <a:bodyPr rtlCol="0" anchor="ctr"/>
+            <a:lstStyle/>
+            <a:p>
+              <a:pPr algn="ctr"/>
+              <a:endParaRPr lang="en-US" dirty="0"/>
+            </a:p>
+          </p:txBody>
+        </p:sp>
+        <p:sp>
+          <p:nvSpPr>
+            <p:cNvPr id="87" name="Oval 86"/>
+            <p:cNvSpPr/>
+            <p:nvPr/>
+          </p:nvSpPr>
+          <p:spPr>
+            <a:xfrm>
+              <a:off x="5562600" y="4105656"/>
+              <a:ext cx="304800" cy="304800"/>
+            </a:xfrm>
+            <a:prstGeom prst="ellipse">
+              <a:avLst/>
+            </a:prstGeom>
+            <a:solidFill>
+              <a:schemeClr val="tx1"/>
+            </a:solidFill>
+            <a:ln>
+              <a:noFill/>
+            </a:ln>
+          </p:spPr>
+          <p:style>
+            <a:lnRef idx="2">
+              <a:schemeClr val="accent1">
+                <a:shade val="50000"/>
+              </a:schemeClr>
+            </a:lnRef>
+            <a:fillRef idx="1">
+              <a:schemeClr val="accent1"/>
+            </a:fillRef>
+            <a:effectRef idx="0">
+              <a:schemeClr val="accent1"/>
+            </a:effectRef>
+            <a:fontRef idx="minor">
+              <a:schemeClr val="lt1"/>
+            </a:fontRef>
+          </p:style>
+          <p:txBody>
+            <a:bodyPr rtlCol="0" anchor="ctr"/>
+            <a:lstStyle/>
+            <a:p>
+              <a:pPr algn="ctr"/>
+              <a:endParaRPr lang="en-US" dirty="0"/>
+            </a:p>
+          </p:txBody>
+        </p:sp>
+        <p:cxnSp>
+          <p:nvCxnSpPr>
+            <p:cNvPr id="88" name="Straight Connector 87"/>
+            <p:cNvCxnSpPr>
+              <a:stCxn id="84" idx="6"/>
+              <a:endCxn id="85" idx="2"/>
+            </p:cNvCxnSpPr>
+            <p:nvPr/>
+          </p:nvCxnSpPr>
+          <p:spPr>
+            <a:xfrm>
+              <a:off x="5257800" y="3724656"/>
+              <a:ext cx="295656" cy="0"/>
+            </a:xfrm>
+            <a:prstGeom prst="line">
+              <a:avLst/>
+            </a:prstGeom>
+            <a:ln w="25400">
+              <a:solidFill>
+                <a:schemeClr val="tx1"/>
+              </a:solidFill>
+            </a:ln>
+          </p:spPr>
+          <p:style>
+            <a:lnRef idx="1">
+              <a:schemeClr val="accent1"/>
+            </a:lnRef>
+            <a:fillRef idx="0">
+              <a:schemeClr val="accent1"/>
+            </a:fillRef>
+            <a:effectRef idx="0">
+              <a:schemeClr val="accent1"/>
+            </a:effectRef>
+            <a:fontRef idx="minor">
+              <a:schemeClr val="tx1"/>
+            </a:fontRef>
+          </p:style>
+        </p:cxnSp>
+        <p:cxnSp>
+          <p:nvCxnSpPr>
+            <p:cNvPr id="89" name="Straight Connector 88"/>
+            <p:cNvCxnSpPr>
+              <a:stCxn id="86" idx="6"/>
+              <a:endCxn id="87" idx="2"/>
+            </p:cNvCxnSpPr>
+            <p:nvPr/>
+          </p:nvCxnSpPr>
+          <p:spPr>
+            <a:xfrm>
+              <a:off x="5257800" y="4258056"/>
+              <a:ext cx="304800" cy="0"/>
+            </a:xfrm>
+            <a:prstGeom prst="line">
+              <a:avLst/>
+            </a:prstGeom>
+            <a:ln w="25400">
+              <a:solidFill>
+                <a:schemeClr val="tx1"/>
+              </a:solidFill>
+            </a:ln>
+          </p:spPr>
+          <p:style>
+            <a:lnRef idx="1">
+              <a:schemeClr val="accent1"/>
+            </a:lnRef>
+            <a:fillRef idx="0">
+              <a:schemeClr val="accent1"/>
+            </a:fillRef>
+            <a:effectRef idx="0">
+              <a:schemeClr val="accent1"/>
+            </a:effectRef>
+            <a:fontRef idx="minor">
+              <a:schemeClr val="tx1"/>
+            </a:fontRef>
+          </p:style>
+        </p:cxnSp>
+      </p:grpSp>
+      <p:grpSp>
+        <p:nvGrpSpPr>
+          <p:cNvPr id="106" name="Group 105"/>
+          <p:cNvGrpSpPr/>
+          <p:nvPr/>
+        </p:nvGrpSpPr>
+        <p:grpSpPr>
+          <a:xfrm>
+            <a:off x="4953000" y="4663440"/>
+            <a:ext cx="2590800" cy="838200"/>
+            <a:chOff x="4953000" y="4663440"/>
+            <a:chExt cx="2590800" cy="838200"/>
+          </a:xfrm>
+        </p:grpSpPr>
+        <p:sp>
+          <p:nvSpPr>
+            <p:cNvPr id="94" name="Oval 93"/>
+            <p:cNvSpPr/>
+            <p:nvPr/>
+          </p:nvSpPr>
+          <p:spPr>
+            <a:xfrm>
+              <a:off x="4953000" y="4663440"/>
+              <a:ext cx="304800" cy="304800"/>
+            </a:xfrm>
+            <a:prstGeom prst="ellipse">
+              <a:avLst/>
+            </a:prstGeom>
+            <a:solidFill>
+              <a:schemeClr val="accent6"/>
+            </a:solidFill>
+            <a:ln>
+              <a:noFill/>
+            </a:ln>
+          </p:spPr>
+          <p:style>
+            <a:lnRef idx="2">
+              <a:schemeClr val="accent1">
+                <a:shade val="50000"/>
+              </a:schemeClr>
+            </a:lnRef>
+            <a:fillRef idx="1">
+              <a:schemeClr val="accent1"/>
+            </a:fillRef>
+            <a:effectRef idx="0">
+              <a:schemeClr val="accent1"/>
+            </a:effectRef>
+            <a:fontRef idx="minor">
+              <a:schemeClr val="lt1"/>
+            </a:fontRef>
+          </p:style>
+          <p:txBody>
+            <a:bodyPr rtlCol="0" anchor="ctr"/>
+            <a:lstStyle/>
+            <a:p>
+              <a:pPr algn="ctr"/>
+              <a:endParaRPr lang="en-US" dirty="0"/>
+            </a:p>
+          </p:txBody>
+        </p:sp>
+        <p:sp>
+          <p:nvSpPr>
+            <p:cNvPr id="95" name="Oval 94"/>
+            <p:cNvSpPr/>
+            <p:nvPr/>
+          </p:nvSpPr>
+          <p:spPr>
+            <a:xfrm>
+              <a:off x="5486400" y="4663440"/>
+              <a:ext cx="304800" cy="304800"/>
+            </a:xfrm>
+            <a:prstGeom prst="ellipse">
+              <a:avLst/>
+            </a:prstGeom>
+            <a:solidFill>
+              <a:schemeClr val="tx1"/>
+            </a:solidFill>
+            <a:ln>
+              <a:noFill/>
+            </a:ln>
+          </p:spPr>
+          <p:style>
+            <a:lnRef idx="2">
+              <a:schemeClr val="accent1">
+                <a:shade val="50000"/>
+              </a:schemeClr>
+            </a:lnRef>
+            <a:fillRef idx="1">
+              <a:schemeClr val="accent1"/>
+            </a:fillRef>
+            <a:effectRef idx="0">
+              <a:schemeClr val="accent1"/>
+            </a:effectRef>
+            <a:fontRef idx="minor">
+              <a:schemeClr val="lt1"/>
+            </a:fontRef>
+          </p:style>
+          <p:txBody>
+            <a:bodyPr rtlCol="0" anchor="ctr"/>
+            <a:lstStyle/>
+            <a:p>
+              <a:pPr algn="ctr"/>
+              <a:endParaRPr lang="en-US" dirty="0"/>
+            </a:p>
+          </p:txBody>
+        </p:sp>
+        <p:sp>
+          <p:nvSpPr>
+            <p:cNvPr id="96" name="Oval 95"/>
+            <p:cNvSpPr/>
+            <p:nvPr/>
+          </p:nvSpPr>
+          <p:spPr>
+            <a:xfrm>
+              <a:off x="4953000" y="5196840"/>
+              <a:ext cx="304800" cy="304800"/>
+            </a:xfrm>
+            <a:prstGeom prst="ellipse">
+              <a:avLst/>
+            </a:prstGeom>
+            <a:solidFill>
+              <a:schemeClr val="accent6"/>
+            </a:solidFill>
+            <a:ln>
+              <a:noFill/>
+            </a:ln>
+          </p:spPr>
+          <p:style>
+            <a:lnRef idx="2">
+              <a:schemeClr val="accent1">
+                <a:shade val="50000"/>
+              </a:schemeClr>
+            </a:lnRef>
+            <a:fillRef idx="1">
+              <a:schemeClr val="accent1"/>
+            </a:fillRef>
+            <a:effectRef idx="0">
+              <a:schemeClr val="accent1"/>
+            </a:effectRef>
+            <a:fontRef idx="minor">
+              <a:schemeClr val="lt1"/>
+            </a:fontRef>
+          </p:style>
+          <p:txBody>
+            <a:bodyPr rtlCol="0" anchor="ctr"/>
+            <a:lstStyle/>
+            <a:p>
+              <a:pPr algn="ctr"/>
+              <a:endParaRPr lang="en-US" dirty="0"/>
+            </a:p>
+          </p:txBody>
+        </p:sp>
+        <p:sp>
+          <p:nvSpPr>
+            <p:cNvPr id="97" name="Oval 96"/>
+            <p:cNvSpPr/>
+            <p:nvPr/>
+          </p:nvSpPr>
+          <p:spPr>
+            <a:xfrm>
+              <a:off x="5486400" y="5196840"/>
+              <a:ext cx="304800" cy="304800"/>
+            </a:xfrm>
+            <a:prstGeom prst="ellipse">
+              <a:avLst/>
+            </a:prstGeom>
+            <a:solidFill>
+              <a:schemeClr val="accent6"/>
+            </a:solidFill>
+            <a:ln>
+              <a:noFill/>
+            </a:ln>
+          </p:spPr>
+          <p:style>
+            <a:lnRef idx="2">
+              <a:schemeClr val="accent1">
+                <a:shade val="50000"/>
+              </a:schemeClr>
+            </a:lnRef>
+            <a:fillRef idx="1">
+              <a:schemeClr val="accent1"/>
+            </a:fillRef>
+            <a:effectRef idx="0">
+              <a:schemeClr val="accent1"/>
+            </a:effectRef>
+            <a:fontRef idx="minor">
+              <a:schemeClr val="lt1"/>
+            </a:fontRef>
+          </p:style>
+          <p:txBody>
+            <a:bodyPr rtlCol="0" anchor="ctr"/>
+            <a:lstStyle/>
+            <a:p>
+              <a:pPr algn="ctr"/>
+              <a:endParaRPr lang="en-US" dirty="0"/>
+            </a:p>
+          </p:txBody>
+        </p:sp>
+        <p:sp>
+          <p:nvSpPr>
+            <p:cNvPr id="100" name="Oval 99"/>
+            <p:cNvSpPr/>
+            <p:nvPr/>
+          </p:nvSpPr>
+          <p:spPr>
+            <a:xfrm>
+              <a:off x="6705600" y="4663440"/>
+              <a:ext cx="304800" cy="304800"/>
+            </a:xfrm>
+            <a:prstGeom prst="ellipse">
+              <a:avLst/>
+            </a:prstGeom>
+            <a:solidFill>
+              <a:schemeClr val="accent6"/>
+            </a:solidFill>
+            <a:ln>
+              <a:noFill/>
+            </a:ln>
+          </p:spPr>
+          <p:style>
+            <a:lnRef idx="2">
+              <a:schemeClr val="accent1">
+                <a:shade val="50000"/>
+              </a:schemeClr>
+            </a:lnRef>
+            <a:fillRef idx="1">
+              <a:schemeClr val="accent1"/>
+            </a:fillRef>
+            <a:effectRef idx="0">
+              <a:schemeClr val="accent1"/>
+            </a:effectRef>
+            <a:fontRef idx="minor">
+              <a:schemeClr val="lt1"/>
+            </a:fontRef>
+          </p:style>
+          <p:txBody>
+            <a:bodyPr rtlCol="0" anchor="ctr"/>
+            <a:lstStyle/>
+            <a:p>
+              <a:pPr algn="ctr"/>
+              <a:endParaRPr lang="en-US" dirty="0"/>
+            </a:p>
+          </p:txBody>
+        </p:sp>
+        <p:sp>
+          <p:nvSpPr>
+            <p:cNvPr id="101" name="Oval 100"/>
+            <p:cNvSpPr/>
+            <p:nvPr/>
+          </p:nvSpPr>
+          <p:spPr>
+            <a:xfrm>
+              <a:off x="7239000" y="4663440"/>
+              <a:ext cx="304800" cy="304800"/>
+            </a:xfrm>
+            <a:prstGeom prst="ellipse">
+              <a:avLst/>
+            </a:prstGeom>
+            <a:solidFill>
+              <a:schemeClr val="tx1"/>
+            </a:solidFill>
+            <a:ln>
+              <a:noFill/>
+            </a:ln>
+          </p:spPr>
+          <p:style>
+            <a:lnRef idx="2">
+              <a:schemeClr val="accent1">
+                <a:shade val="50000"/>
+              </a:schemeClr>
+            </a:lnRef>
+            <a:fillRef idx="1">
+              <a:schemeClr val="accent1"/>
+            </a:fillRef>
+            <a:effectRef idx="0">
+              <a:schemeClr val="accent1"/>
+            </a:effectRef>
+            <a:fontRef idx="minor">
+              <a:schemeClr val="lt1"/>
+            </a:fontRef>
+          </p:style>
+          <p:txBody>
+            <a:bodyPr rtlCol="0" anchor="ctr"/>
+            <a:lstStyle/>
+            <a:p>
+              <a:pPr algn="ctr"/>
+              <a:endParaRPr lang="en-US" dirty="0"/>
+            </a:p>
+          </p:txBody>
+        </p:sp>
+        <p:sp>
+          <p:nvSpPr>
+            <p:cNvPr id="102" name="Oval 101"/>
+            <p:cNvSpPr/>
+            <p:nvPr/>
+          </p:nvSpPr>
+          <p:spPr>
+            <a:xfrm>
+              <a:off x="6705600" y="5196840"/>
+              <a:ext cx="304800" cy="304800"/>
+            </a:xfrm>
+            <a:prstGeom prst="ellipse">
+              <a:avLst/>
+            </a:prstGeom>
+            <a:solidFill>
+              <a:schemeClr val="accent6"/>
+            </a:solidFill>
+            <a:ln>
+              <a:noFill/>
+            </a:ln>
+          </p:spPr>
+          <p:style>
+            <a:lnRef idx="2">
+              <a:schemeClr val="accent1">
+                <a:shade val="50000"/>
+              </a:schemeClr>
+            </a:lnRef>
+            <a:fillRef idx="1">
+              <a:schemeClr val="accent1"/>
+            </a:fillRef>
+            <a:effectRef idx="0">
+              <a:schemeClr val="accent1"/>
+            </a:effectRef>
+            <a:fontRef idx="minor">
+              <a:schemeClr val="lt1"/>
+            </a:fontRef>
+          </p:style>
+          <p:txBody>
+            <a:bodyPr rtlCol="0" anchor="ctr"/>
+            <a:lstStyle/>
+            <a:p>
+              <a:pPr algn="ctr"/>
+              <a:endParaRPr lang="en-US" dirty="0"/>
+            </a:p>
+          </p:txBody>
+        </p:sp>
+        <p:sp>
+          <p:nvSpPr>
+            <p:cNvPr id="103" name="Oval 102"/>
+            <p:cNvSpPr/>
+            <p:nvPr/>
+          </p:nvSpPr>
+          <p:spPr>
+            <a:xfrm>
+              <a:off x="7239000" y="5196840"/>
+              <a:ext cx="304800" cy="304800"/>
+            </a:xfrm>
+            <a:prstGeom prst="ellipse">
+              <a:avLst/>
+            </a:prstGeom>
+            <a:solidFill>
+              <a:schemeClr val="tx1"/>
+            </a:solidFill>
+            <a:ln>
+              <a:noFill/>
+            </a:ln>
+          </p:spPr>
+          <p:style>
+            <a:lnRef idx="2">
+              <a:schemeClr val="accent1">
+                <a:shade val="50000"/>
+              </a:schemeClr>
+            </a:lnRef>
+            <a:fillRef idx="1">
+              <a:schemeClr val="accent1"/>
+            </a:fillRef>
+            <a:effectRef idx="0">
+              <a:schemeClr val="accent1"/>
+            </a:effectRef>
+            <a:fontRef idx="minor">
+              <a:schemeClr val="lt1"/>
+            </a:fontRef>
+          </p:style>
+          <p:txBody>
+            <a:bodyPr rtlCol="0" anchor="ctr"/>
+            <a:lstStyle/>
+            <a:p>
+              <a:pPr algn="ctr"/>
+              <a:endParaRPr lang="en-US" dirty="0"/>
+            </a:p>
+          </p:txBody>
+        </p:sp>
+      </p:grpSp>
+    </p:spTree>
+    <p:extLst>
+      <p:ext uri="{BB962C8B-B14F-4D97-AF65-F5344CB8AC3E}">
+        <p14:creationId xmlns:p14="http://schemas.microsoft.com/office/powerpoint/2010/main" val="1942568089"/>
+      </p:ext>
+    </p:extLst>
+  </p:cSld>
+  <p:clrMapOvr>
+    <a:masterClrMapping/>
+  </p:clrMapOvr>
+</p:sld>
+</file>
+
+<file path=ppt/slides/slide11.xml><?xml version="1.0" encoding="utf-8"?>
+<p:sld xmlns:a="http://schemas.openxmlformats.org/drawingml/2006/main" xmlns:r="http://schemas.openxmlformats.org/officeDocument/2006/relationships" xmlns:p="http://schemas.openxmlformats.org/presentationml/2006/main">
+  <p:cSld>
+    <p:spTree>
+      <p:nvGrpSpPr>
+        <p:cNvPr id="1" name=""/>
+        <p:cNvGrpSpPr/>
+        <p:nvPr/>
+      </p:nvGrpSpPr>
+      <p:grpSpPr>
+        <a:xfrm>
+          <a:off x="0" y="0"/>
+          <a:ext cx="0" cy="0"/>
+          <a:chOff x="0" y="0"/>
+          <a:chExt cx="0" cy="0"/>
+        </a:xfrm>
+      </p:grpSpPr>
+      <p:grpSp>
+        <p:nvGrpSpPr>
+          <p:cNvPr id="7" name="Group 6"/>
+          <p:cNvGrpSpPr/>
+          <p:nvPr/>
+        </p:nvGrpSpPr>
+        <p:grpSpPr>
+          <a:xfrm>
+            <a:off x="1600200" y="609600"/>
+            <a:ext cx="5192451" cy="5632311"/>
+            <a:chOff x="1600200" y="609600"/>
+            <a:chExt cx="5192451" cy="5632311"/>
+          </a:xfrm>
+        </p:grpSpPr>
+        <p:sp>
+          <p:nvSpPr>
+            <p:cNvPr id="2" name="TextBox 1"/>
+            <p:cNvSpPr txBox="1"/>
+            <p:nvPr/>
+          </p:nvSpPr>
+          <p:spPr>
+            <a:xfrm>
+              <a:off x="3733800" y="609600"/>
+              <a:ext cx="3058851" cy="5632311"/>
+            </a:xfrm>
+            <a:prstGeom prst="rect">
+              <a:avLst/>
+            </a:prstGeom>
+            <a:noFill/>
+          </p:spPr>
+          <p:txBody>
+            <a:bodyPr wrap="none" rtlCol="0">
+              <a:spAutoFit/>
+            </a:bodyPr>
+            <a:lstStyle/>
+            <a:p>
+              <a:r>
+                <a:rPr lang="en-US" dirty="0" smtClean="0">
+                  <a:latin typeface="Linux Biolinum" charset="0"/>
+                  <a:ea typeface="Linux Biolinum" charset="0"/>
+                  <a:cs typeface="Linux Biolinum" charset="0"/>
+                </a:rPr>
+                <a:t>0     98766562	</a:t>
+              </a:r>
+            </a:p>
+            <a:p>
+              <a:pPr marL="342900" indent="-342900">
+                <a:buAutoNum type="arabicPlain"/>
+              </a:pPr>
+              <a:r>
+                <a:rPr lang="en-US" dirty="0" smtClean="0">
+                  <a:latin typeface="Linux Biolinum" charset="0"/>
+                  <a:ea typeface="Linux Biolinum" charset="0"/>
+                  <a:cs typeface="Linux Biolinum" charset="0"/>
+                </a:rPr>
+                <a:t> 97719630</a:t>
+              </a:r>
+            </a:p>
+            <a:p>
+              <a:pPr marL="342900" indent="-342900">
+                <a:buAutoNum type="arabicPlain"/>
+              </a:pPr>
+              <a:r>
+                <a:rPr lang="en-US" dirty="0" smtClean="0">
+                  <a:latin typeface="Linux Biolinum" charset="0"/>
+                  <a:ea typeface="Linux Biolinum" charset="0"/>
+                  <a:cs typeface="Linux Biolinum" charset="0"/>
+                </a:rPr>
+                <a:t> 69987766544422211009850</a:t>
+              </a:r>
+            </a:p>
+            <a:p>
+              <a:pPr marL="342900" indent="-342900">
+                <a:buAutoNum type="arabicPlain"/>
+              </a:pPr>
+              <a:r>
+                <a:rPr lang="en-US" dirty="0" smtClean="0">
+                  <a:latin typeface="Linux Biolinum" charset="0"/>
+                  <a:ea typeface="Linux Biolinum" charset="0"/>
+                  <a:cs typeface="Linux Biolinum" charset="0"/>
+                </a:rPr>
+                <a:t> 876655412099551426</a:t>
+              </a:r>
+            </a:p>
+            <a:p>
+              <a:pPr marL="342900" indent="-342900">
+                <a:buAutoNum type="arabicPlain"/>
+              </a:pPr>
+              <a:r>
+                <a:rPr lang="en-US" dirty="0" smtClean="0">
+                  <a:latin typeface="Linux Biolinum" charset="0"/>
+                  <a:ea typeface="Linux Biolinum" charset="0"/>
+                  <a:cs typeface="Linux Biolinum" charset="0"/>
+                </a:rPr>
+                <a:t> 9998844331929433361107</a:t>
+              </a:r>
+            </a:p>
+            <a:p>
+              <a:pPr marL="342900" indent="-342900">
+                <a:buAutoNum type="arabicPlain"/>
+              </a:pPr>
+              <a:r>
+                <a:rPr lang="en-US" dirty="0" smtClean="0">
+                  <a:latin typeface="Linux Biolinum" charset="0"/>
+                  <a:ea typeface="Linux Biolinum" charset="0"/>
+                  <a:cs typeface="Linux Biolinum" charset="0"/>
+                </a:rPr>
+                <a:t> 97666666554422210097731</a:t>
+              </a:r>
+            </a:p>
+            <a:p>
+              <a:pPr marL="342900" indent="-342900">
+                <a:buAutoNum type="arabicPlain"/>
+              </a:pPr>
+              <a:r>
+                <a:rPr lang="en-US" dirty="0" smtClean="0">
+                  <a:latin typeface="Linux Biolinum" charset="0"/>
+                  <a:ea typeface="Linux Biolinum" charset="0"/>
+                  <a:cs typeface="Linux Biolinum" charset="0"/>
+                </a:rPr>
+                <a:t> 898665441077761065</a:t>
+              </a:r>
+            </a:p>
+            <a:p>
+              <a:pPr marL="342900" indent="-342900">
+                <a:buAutoNum type="arabicPlain"/>
+              </a:pPr>
+              <a:r>
+                <a:rPr lang="en-US" dirty="0" smtClean="0">
+                  <a:latin typeface="Linux Biolinum" charset="0"/>
+                  <a:ea typeface="Linux Biolinum" charset="0"/>
+                  <a:cs typeface="Linux Biolinum" charset="0"/>
+                </a:rPr>
+                <a:t> 98855431100652108073</a:t>
+              </a:r>
+            </a:p>
+            <a:p>
+              <a:pPr marL="342900" indent="-342900">
+                <a:buAutoNum type="arabicPlain"/>
+              </a:pPr>
+              <a:r>
+                <a:rPr lang="en-US" dirty="0" smtClean="0">
+                  <a:latin typeface="Linux Biolinum" charset="0"/>
+                  <a:ea typeface="Linux Biolinum" charset="0"/>
+                  <a:cs typeface="Linux Biolinum" charset="0"/>
+                </a:rPr>
+                <a:t> 653322122937</a:t>
+              </a:r>
+            </a:p>
+            <a:p>
+              <a:pPr marL="342900" indent="-342900">
+                <a:buAutoNum type="arabicPlain"/>
+              </a:pPr>
+              <a:r>
+                <a:rPr lang="en-US" dirty="0" smtClean="0">
+                  <a:latin typeface="Linux Biolinum" charset="0"/>
+                  <a:ea typeface="Linux Biolinum" charset="0"/>
+                  <a:cs typeface="Linux Biolinum" charset="0"/>
+                </a:rPr>
+                <a:t> 377655421000493</a:t>
+              </a:r>
+            </a:p>
+            <a:p>
+              <a:pPr marL="342900" indent="-342900">
+                <a:buAutoNum type="arabicPlain"/>
+              </a:pPr>
+              <a:r>
+                <a:rPr lang="en-US" dirty="0" smtClean="0">
+                  <a:latin typeface="Linux Biolinum" charset="0"/>
+                  <a:ea typeface="Linux Biolinum" charset="0"/>
+                  <a:cs typeface="Linux Biolinum" charset="0"/>
+                </a:rPr>
+                <a:t> 0984433165212</a:t>
+              </a:r>
+            </a:p>
+            <a:p>
+              <a:pPr marL="342900" indent="-342900">
+                <a:buAutoNum type="arabicPlain"/>
+              </a:pPr>
+              <a:r>
+                <a:rPr lang="en-US" dirty="0" smtClean="0">
+                  <a:latin typeface="Linux Biolinum" charset="0"/>
+                  <a:ea typeface="Linux Biolinum" charset="0"/>
+                  <a:cs typeface="Linux Biolinum" charset="0"/>
+                </a:rPr>
+                <a:t> 4963201631</a:t>
+              </a:r>
+            </a:p>
+            <a:p>
+              <a:pPr marL="342900" indent="-342900">
+                <a:buAutoNum type="arabicPlain"/>
+              </a:pPr>
+              <a:r>
+                <a:rPr lang="en-US" dirty="0" smtClean="0">
+                  <a:latin typeface="Linux Biolinum" charset="0"/>
+                  <a:ea typeface="Linux Biolinum" charset="0"/>
+                  <a:cs typeface="Linux Biolinum" charset="0"/>
+                </a:rPr>
+                <a:t> 45421164</a:t>
+              </a:r>
+            </a:p>
+            <a:p>
+              <a:pPr marL="342900" indent="-342900">
+                <a:buAutoNum type="arabicPlain"/>
+              </a:pPr>
+              <a:r>
+                <a:rPr lang="en-US" dirty="0" smtClean="0">
+                  <a:latin typeface="Linux Biolinum" charset="0"/>
+                  <a:ea typeface="Linux Biolinum" charset="0"/>
+                  <a:cs typeface="Linux Biolinum" charset="0"/>
+                </a:rPr>
+                <a:t> 47830</a:t>
+              </a:r>
+            </a:p>
+            <a:p>
+              <a:pPr marL="342900" indent="-342900">
+                <a:buAutoNum type="arabicPlain"/>
+              </a:pPr>
+              <a:r>
+                <a:rPr lang="en-US" dirty="0" smtClean="0">
+                  <a:latin typeface="Linux Biolinum" charset="0"/>
+                  <a:ea typeface="Linux Biolinum" charset="0"/>
+                  <a:cs typeface="Linux Biolinum" charset="0"/>
+                </a:rPr>
+                <a:t> 00</a:t>
+              </a:r>
+            </a:p>
+            <a:p>
+              <a:pPr marL="342900" indent="-342900">
+                <a:buAutoNum type="arabicPlain"/>
+              </a:pPr>
+              <a:r>
+                <a:rPr lang="en-US" dirty="0" smtClean="0">
+                  <a:latin typeface="Linux Biolinum" charset="0"/>
+                  <a:ea typeface="Linux Biolinum" charset="0"/>
+                  <a:cs typeface="Linux Biolinum" charset="0"/>
+                </a:rPr>
+                <a:t> 676</a:t>
+              </a:r>
+            </a:p>
+            <a:p>
+              <a:pPr marL="342900" indent="-342900">
+                <a:buAutoNum type="arabicPlain"/>
+              </a:pPr>
+              <a:r>
+                <a:rPr lang="en-US" dirty="0" smtClean="0">
+                  <a:latin typeface="Linux Biolinum" charset="0"/>
+                  <a:ea typeface="Linux Biolinum" charset="0"/>
+                  <a:cs typeface="Linux Biolinum" charset="0"/>
+                </a:rPr>
+                <a:t> 52</a:t>
+              </a:r>
+            </a:p>
+            <a:p>
+              <a:pPr marL="342900" indent="-342900">
+                <a:buAutoNum type="arabicPlain"/>
+              </a:pPr>
+              <a:r>
+                <a:rPr lang="en-US" dirty="0" smtClean="0">
+                  <a:latin typeface="Linux Biolinum" charset="0"/>
+                  <a:ea typeface="Linux Biolinum" charset="0"/>
+                  <a:cs typeface="Linux Biolinum" charset="0"/>
+                </a:rPr>
+                <a:t> 92</a:t>
+              </a:r>
+            </a:p>
+            <a:p>
+              <a:pPr marL="342900" indent="-342900">
+                <a:buAutoNum type="arabicPlain"/>
+              </a:pPr>
+              <a:r>
+                <a:rPr lang="en-US" dirty="0" smtClean="0">
+                  <a:latin typeface="Linux Biolinum" charset="0"/>
+                  <a:ea typeface="Linux Biolinum" charset="0"/>
+                  <a:cs typeface="Linux Biolinum" charset="0"/>
+                </a:rPr>
+                <a:t> 5</a:t>
+              </a:r>
+            </a:p>
+            <a:p>
+              <a:pPr marL="342900" indent="-342900">
+                <a:buAutoNum type="arabicPlain"/>
+              </a:pPr>
+              <a:r>
+                <a:rPr lang="en-US" dirty="0" smtClean="0">
+                  <a:latin typeface="Linux Biolinum" charset="0"/>
+                  <a:ea typeface="Linux Biolinum" charset="0"/>
+                  <a:cs typeface="Linux Biolinum" charset="0"/>
+                </a:rPr>
+                <a:t> 39730</a:t>
+              </a:r>
+              <a:endParaRPr lang="en-US" dirty="0">
+                <a:latin typeface="Linux Biolinum" charset="0"/>
+                <a:ea typeface="Linux Biolinum" charset="0"/>
+                <a:cs typeface="Linux Biolinum" charset="0"/>
+              </a:endParaRPr>
+            </a:p>
+          </p:txBody>
+        </p:sp>
+        <p:cxnSp>
+          <p:nvCxnSpPr>
+            <p:cNvPr id="4" name="Straight Connector 3"/>
+            <p:cNvCxnSpPr/>
+            <p:nvPr/>
+          </p:nvCxnSpPr>
+          <p:spPr>
+            <a:xfrm>
+              <a:off x="4114800" y="684000"/>
+              <a:ext cx="0" cy="5410200"/>
+            </a:xfrm>
+            <a:prstGeom prst="line">
+              <a:avLst/>
+            </a:prstGeom>
+            <a:ln w="15875">
+              <a:solidFill>
+                <a:schemeClr val="tx1"/>
+              </a:solidFill>
+            </a:ln>
+          </p:spPr>
+          <p:style>
+            <a:lnRef idx="1">
+              <a:schemeClr val="accent1"/>
+            </a:lnRef>
+            <a:fillRef idx="0">
+              <a:schemeClr val="accent1"/>
+            </a:fillRef>
+            <a:effectRef idx="0">
+              <a:schemeClr val="accent1"/>
+            </a:effectRef>
+            <a:fontRef idx="minor">
+              <a:schemeClr val="tx1"/>
+            </a:fontRef>
+          </p:style>
+        </p:cxnSp>
+        <p:sp>
+          <p:nvSpPr>
+            <p:cNvPr id="6" name="TextBox 5"/>
+            <p:cNvSpPr txBox="1"/>
+            <p:nvPr/>
+          </p:nvSpPr>
+          <p:spPr>
+            <a:xfrm>
+              <a:off x="1600200" y="609600"/>
+              <a:ext cx="1912703" cy="5632311"/>
+            </a:xfrm>
+            <a:prstGeom prst="rect">
+              <a:avLst/>
+            </a:prstGeom>
+            <a:noFill/>
+          </p:spPr>
+          <p:txBody>
+            <a:bodyPr wrap="none" rtlCol="0">
+              <a:spAutoFit/>
+            </a:bodyPr>
+            <a:lstStyle/>
+            <a:p>
+              <a:r>
+                <a:rPr lang="en-US" dirty="0" smtClean="0">
+                  <a:latin typeface="Linux Biolinum" charset="0"/>
+                  <a:ea typeface="Linux Biolinum" charset="0"/>
+                  <a:cs typeface="Linux Biolinum" charset="0"/>
+                </a:rPr>
+                <a:t>0 | 9 = 900 feet</a:t>
+              </a:r>
+            </a:p>
+            <a:p>
+              <a:endParaRPr lang="en-US" dirty="0">
+                <a:latin typeface="Linux Biolinum" charset="0"/>
+                <a:ea typeface="Linux Biolinum" charset="0"/>
+                <a:cs typeface="Linux Biolinum" charset="0"/>
+              </a:endParaRPr>
+            </a:p>
+            <a:p>
+              <a:endParaRPr lang="en-US" dirty="0" smtClean="0">
+                <a:latin typeface="Linux Biolinum" charset="0"/>
+                <a:ea typeface="Linux Biolinum" charset="0"/>
+                <a:cs typeface="Linux Biolinum" charset="0"/>
+              </a:endParaRPr>
+            </a:p>
+            <a:p>
+              <a:endParaRPr lang="en-US" dirty="0">
+                <a:latin typeface="Linux Biolinum" charset="0"/>
+                <a:ea typeface="Linux Biolinum" charset="0"/>
+                <a:cs typeface="Linux Biolinum" charset="0"/>
+              </a:endParaRPr>
+            </a:p>
+            <a:p>
+              <a:endParaRPr lang="en-US" dirty="0" smtClean="0">
+                <a:latin typeface="Linux Biolinum" charset="0"/>
+                <a:ea typeface="Linux Biolinum" charset="0"/>
+                <a:cs typeface="Linux Biolinum" charset="0"/>
+              </a:endParaRPr>
+            </a:p>
+            <a:p>
+              <a:endParaRPr lang="en-US" dirty="0">
+                <a:latin typeface="Linux Biolinum" charset="0"/>
+                <a:ea typeface="Linux Biolinum" charset="0"/>
+                <a:cs typeface="Linux Biolinum" charset="0"/>
+              </a:endParaRPr>
+            </a:p>
+            <a:p>
+              <a:endParaRPr lang="en-US" dirty="0" smtClean="0">
+                <a:latin typeface="Linux Biolinum" charset="0"/>
+                <a:ea typeface="Linux Biolinum" charset="0"/>
+                <a:cs typeface="Linux Biolinum" charset="0"/>
+              </a:endParaRPr>
+            </a:p>
+            <a:p>
+              <a:endParaRPr lang="en-US" dirty="0">
+                <a:latin typeface="Linux Biolinum" charset="0"/>
+                <a:ea typeface="Linux Biolinum" charset="0"/>
+                <a:cs typeface="Linux Biolinum" charset="0"/>
+              </a:endParaRPr>
+            </a:p>
+            <a:p>
+              <a:endParaRPr lang="en-US" dirty="0" smtClean="0">
+                <a:latin typeface="Linux Biolinum" charset="0"/>
+                <a:ea typeface="Linux Biolinum" charset="0"/>
+                <a:cs typeface="Linux Biolinum" charset="0"/>
+              </a:endParaRPr>
+            </a:p>
+            <a:p>
+              <a:endParaRPr lang="en-US" dirty="0" smtClean="0">
+                <a:latin typeface="Linux Biolinum" charset="0"/>
+                <a:ea typeface="Linux Biolinum" charset="0"/>
+                <a:cs typeface="Linux Biolinum" charset="0"/>
+              </a:endParaRPr>
+            </a:p>
+            <a:p>
+              <a:endParaRPr lang="en-US" dirty="0" smtClean="0">
+                <a:latin typeface="Linux Biolinum" charset="0"/>
+                <a:ea typeface="Linux Biolinum" charset="0"/>
+                <a:cs typeface="Linux Biolinum" charset="0"/>
+              </a:endParaRPr>
+            </a:p>
+            <a:p>
+              <a:endParaRPr lang="en-US" dirty="0">
+                <a:latin typeface="Linux Biolinum" charset="0"/>
+                <a:ea typeface="Linux Biolinum" charset="0"/>
+                <a:cs typeface="Linux Biolinum" charset="0"/>
+              </a:endParaRPr>
+            </a:p>
+            <a:p>
+              <a:endParaRPr lang="en-US" dirty="0" smtClean="0">
+                <a:latin typeface="Linux Biolinum" charset="0"/>
+                <a:ea typeface="Linux Biolinum" charset="0"/>
+                <a:cs typeface="Linux Biolinum" charset="0"/>
+              </a:endParaRPr>
+            </a:p>
+            <a:p>
+              <a:endParaRPr lang="en-US" dirty="0">
+                <a:latin typeface="Linux Biolinum" charset="0"/>
+                <a:ea typeface="Linux Biolinum" charset="0"/>
+                <a:cs typeface="Linux Biolinum" charset="0"/>
+              </a:endParaRPr>
+            </a:p>
+            <a:p>
+              <a:endParaRPr lang="en-US" dirty="0" smtClean="0">
+                <a:latin typeface="Linux Biolinum" charset="0"/>
+                <a:ea typeface="Linux Biolinum" charset="0"/>
+                <a:cs typeface="Linux Biolinum" charset="0"/>
+              </a:endParaRPr>
+            </a:p>
+            <a:p>
+              <a:endParaRPr lang="en-US" dirty="0">
+                <a:latin typeface="Linux Biolinum" charset="0"/>
+                <a:ea typeface="Linux Biolinum" charset="0"/>
+                <a:cs typeface="Linux Biolinum" charset="0"/>
+              </a:endParaRPr>
+            </a:p>
+            <a:p>
+              <a:endParaRPr lang="en-US" dirty="0" smtClean="0">
+                <a:latin typeface="Linux Biolinum" charset="0"/>
+                <a:ea typeface="Linux Biolinum" charset="0"/>
+                <a:cs typeface="Linux Biolinum" charset="0"/>
+              </a:endParaRPr>
+            </a:p>
+            <a:p>
+              <a:endParaRPr lang="en-US" dirty="0">
+                <a:latin typeface="Linux Biolinum" charset="0"/>
+                <a:ea typeface="Linux Biolinum" charset="0"/>
+                <a:cs typeface="Linux Biolinum" charset="0"/>
+              </a:endParaRPr>
+            </a:p>
+            <a:p>
+              <a:endParaRPr lang="en-US" dirty="0" smtClean="0">
+                <a:latin typeface="Linux Biolinum" charset="0"/>
+                <a:ea typeface="Linux Biolinum" charset="0"/>
+                <a:cs typeface="Linux Biolinum" charset="0"/>
+              </a:endParaRPr>
+            </a:p>
+            <a:p>
+              <a:r>
+                <a:rPr lang="en-US" dirty="0" smtClean="0">
+                  <a:latin typeface="Linux Biolinum" charset="0"/>
+                  <a:ea typeface="Linux Biolinum" charset="0"/>
+                  <a:cs typeface="Linux Biolinum" charset="0"/>
+                </a:rPr>
+                <a:t>19 | 3 = 19,300 feet</a:t>
+              </a:r>
+              <a:endParaRPr lang="en-US" dirty="0">
+                <a:latin typeface="Linux Biolinum" charset="0"/>
+                <a:ea typeface="Linux Biolinum" charset="0"/>
+                <a:cs typeface="Linux Biolinum" charset="0"/>
+              </a:endParaRPr>
+            </a:p>
+          </p:txBody>
+        </p:sp>
+      </p:grpSp>
+    </p:spTree>
+    <p:extLst>
+      <p:ext uri="{BB962C8B-B14F-4D97-AF65-F5344CB8AC3E}">
+        <p14:creationId xmlns:p14="http://schemas.microsoft.com/office/powerpoint/2010/main" val="459130942"/>
+      </p:ext>
+    </p:extLst>
+  </p:cSld>
+  <p:clrMapOvr>
+    <a:masterClrMapping/>
+  </p:clrMapOvr>
 </p:sld>
 </file>
 

</xml_diff>